<commit_message>
All beginner lessons updated
</commit_message>
<xml_diff>
--- a/translations/en-us/beginner/Introduction.pptx
+++ b/translations/en-us/beginner/Introduction.pptx
@@ -2,28 +2,25 @@
 <file path=ppt/presentation.xml><?xml version="1.0" encoding="utf-8"?>
 <p:presentation xmlns:a="http://schemas.openxmlformats.org/drawingml/2006/main" xmlns:r="http://schemas.openxmlformats.org/officeDocument/2006/relationships" xmlns:p="http://schemas.openxmlformats.org/presentationml/2006/main" showSpecialPlsOnTitleSld="0" saveSubsetFonts="1" autoCompressPictures="0">
   <p:sldMasterIdLst>
-    <p:sldMasterId id="2147483714" r:id="rId1"/>
-    <p:sldMasterId id="2147483726" r:id="rId2"/>
+    <p:sldMasterId id="2147483660" r:id="rId1"/>
+    <p:sldMasterId id="2147483672" r:id="rId2"/>
   </p:sldMasterIdLst>
   <p:notesMasterIdLst>
     <p:notesMasterId r:id="rId15"/>
   </p:notesMasterIdLst>
-  <p:handoutMasterIdLst>
-    <p:handoutMasterId r:id="rId16"/>
-  </p:handoutMasterIdLst>
   <p:sldIdLst>
-    <p:sldId id="408" r:id="rId3"/>
-    <p:sldId id="411" r:id="rId4"/>
+    <p:sldId id="256" r:id="rId3"/>
+    <p:sldId id="257" r:id="rId4"/>
     <p:sldId id="258" r:id="rId5"/>
-    <p:sldId id="322" r:id="rId6"/>
-    <p:sldId id="290" r:id="rId7"/>
-    <p:sldId id="259" r:id="rId8"/>
-    <p:sldId id="296" r:id="rId9"/>
-    <p:sldId id="409" r:id="rId10"/>
-    <p:sldId id="295" r:id="rId11"/>
-    <p:sldId id="410" r:id="rId12"/>
-    <p:sldId id="400" r:id="rId13"/>
-    <p:sldId id="401" r:id="rId14"/>
+    <p:sldId id="259" r:id="rId6"/>
+    <p:sldId id="260" r:id="rId7"/>
+    <p:sldId id="261" r:id="rId8"/>
+    <p:sldId id="262" r:id="rId9"/>
+    <p:sldId id="263" r:id="rId10"/>
+    <p:sldId id="264" r:id="rId11"/>
+    <p:sldId id="265" r:id="rId12"/>
+    <p:sldId id="266" r:id="rId13"/>
+    <p:sldId id="268" r:id="rId14"/>
   </p:sldIdLst>
   <p:sldSz cx="9144000" cy="6858000" type="screen4x3"/>
   <p:notesSz cx="6858000" cy="9144000"/>
@@ -31,7 +28,7 @@
     <a:defPPr>
       <a:defRPr lang="en-US"/>
     </a:defPPr>
-    <a:lvl1pPr marL="0" algn="l" defTabSz="457200" rtl="0" eaLnBrk="1" latinLnBrk="0" hangingPunct="1">
+    <a:lvl1pPr marL="0" algn="l" defTabSz="914400" rtl="0" eaLnBrk="1" latinLnBrk="0" hangingPunct="1">
       <a:defRPr sz="1800" kern="1200">
         <a:solidFill>
           <a:schemeClr val="tx1"/>
@@ -41,7 +38,7 @@
         <a:cs typeface="+mn-cs"/>
       </a:defRPr>
     </a:lvl1pPr>
-    <a:lvl2pPr marL="457200" algn="l" defTabSz="457200" rtl="0" eaLnBrk="1" latinLnBrk="0" hangingPunct="1">
+    <a:lvl2pPr marL="457200" algn="l" defTabSz="914400" rtl="0" eaLnBrk="1" latinLnBrk="0" hangingPunct="1">
       <a:defRPr sz="1800" kern="1200">
         <a:solidFill>
           <a:schemeClr val="tx1"/>
@@ -51,7 +48,7 @@
         <a:cs typeface="+mn-cs"/>
       </a:defRPr>
     </a:lvl2pPr>
-    <a:lvl3pPr marL="914400" algn="l" defTabSz="457200" rtl="0" eaLnBrk="1" latinLnBrk="0" hangingPunct="1">
+    <a:lvl3pPr marL="914400" algn="l" defTabSz="914400" rtl="0" eaLnBrk="1" latinLnBrk="0" hangingPunct="1">
       <a:defRPr sz="1800" kern="1200">
         <a:solidFill>
           <a:schemeClr val="tx1"/>
@@ -61,7 +58,7 @@
         <a:cs typeface="+mn-cs"/>
       </a:defRPr>
     </a:lvl3pPr>
-    <a:lvl4pPr marL="1371600" algn="l" defTabSz="457200" rtl="0" eaLnBrk="1" latinLnBrk="0" hangingPunct="1">
+    <a:lvl4pPr marL="1371600" algn="l" defTabSz="914400" rtl="0" eaLnBrk="1" latinLnBrk="0" hangingPunct="1">
       <a:defRPr sz="1800" kern="1200">
         <a:solidFill>
           <a:schemeClr val="tx1"/>
@@ -71,7 +68,7 @@
         <a:cs typeface="+mn-cs"/>
       </a:defRPr>
     </a:lvl4pPr>
-    <a:lvl5pPr marL="1828800" algn="l" defTabSz="457200" rtl="0" eaLnBrk="1" latinLnBrk="0" hangingPunct="1">
+    <a:lvl5pPr marL="1828800" algn="l" defTabSz="914400" rtl="0" eaLnBrk="1" latinLnBrk="0" hangingPunct="1">
       <a:defRPr sz="1800" kern="1200">
         <a:solidFill>
           <a:schemeClr val="tx1"/>
@@ -81,7 +78,7 @@
         <a:cs typeface="+mn-cs"/>
       </a:defRPr>
     </a:lvl5pPr>
-    <a:lvl6pPr marL="2286000" algn="l" defTabSz="457200" rtl="0" eaLnBrk="1" latinLnBrk="0" hangingPunct="1">
+    <a:lvl6pPr marL="2286000" algn="l" defTabSz="914400" rtl="0" eaLnBrk="1" latinLnBrk="0" hangingPunct="1">
       <a:defRPr sz="1800" kern="1200">
         <a:solidFill>
           <a:schemeClr val="tx1"/>
@@ -91,7 +88,7 @@
         <a:cs typeface="+mn-cs"/>
       </a:defRPr>
     </a:lvl6pPr>
-    <a:lvl7pPr marL="2743200" algn="l" defTabSz="457200" rtl="0" eaLnBrk="1" latinLnBrk="0" hangingPunct="1">
+    <a:lvl7pPr marL="2743200" algn="l" defTabSz="914400" rtl="0" eaLnBrk="1" latinLnBrk="0" hangingPunct="1">
       <a:defRPr sz="1800" kern="1200">
         <a:solidFill>
           <a:schemeClr val="tx1"/>
@@ -101,7 +98,7 @@
         <a:cs typeface="+mn-cs"/>
       </a:defRPr>
     </a:lvl7pPr>
-    <a:lvl8pPr marL="3200400" algn="l" defTabSz="457200" rtl="0" eaLnBrk="1" latinLnBrk="0" hangingPunct="1">
+    <a:lvl8pPr marL="3200400" algn="l" defTabSz="914400" rtl="0" eaLnBrk="1" latinLnBrk="0" hangingPunct="1">
       <a:defRPr sz="1800" kern="1200">
         <a:solidFill>
           <a:schemeClr val="tx1"/>
@@ -111,7 +108,7 @@
         <a:cs typeface="+mn-cs"/>
       </a:defRPr>
     </a:lvl8pPr>
-    <a:lvl9pPr marL="3657600" algn="l" defTabSz="457200" rtl="0" eaLnBrk="1" latinLnBrk="0" hangingPunct="1">
+    <a:lvl9pPr marL="3657600" algn="l" defTabSz="914400" rtl="0" eaLnBrk="1" latinLnBrk="0" hangingPunct="1">
       <a:defRPr sz="1800" kern="1200">
         <a:solidFill>
           <a:schemeClr val="tx1"/>
@@ -122,189 +119,7 @@
       </a:defRPr>
     </a:lvl9pPr>
   </p:defaultTextStyle>
-  <p:extLst>
-    <p:ext uri="{EFAFB233-063F-42B5-8137-9DF3F51BA10A}">
-      <p15:sldGuideLst xmlns:p15="http://schemas.microsoft.com/office/powerpoint/2012/main">
-        <p15:guide id="1" orient="horz" pos="2160">
-          <p15:clr>
-            <a:srgbClr val="A4A3A4"/>
-          </p15:clr>
-        </p15:guide>
-        <p15:guide id="2" pos="2880">
-          <p15:clr>
-            <a:srgbClr val="A4A3A4"/>
-          </p15:clr>
-        </p15:guide>
-      </p15:sldGuideLst>
-    </p:ext>
-  </p:extLst>
 </p:presentation>
-</file>
-
-<file path=ppt/handoutMasters/handoutMaster1.xml><?xml version="1.0" encoding="utf-8"?>
-<p:handoutMaster xmlns:a="http://schemas.openxmlformats.org/drawingml/2006/main" xmlns:r="http://schemas.openxmlformats.org/officeDocument/2006/relationships" xmlns:p="http://schemas.openxmlformats.org/presentationml/2006/main">
-  <p:cSld>
-    <p:bg>
-      <p:bgRef idx="1001">
-        <a:schemeClr val="bg1"/>
-      </p:bgRef>
-    </p:bg>
-    <p:spTree>
-      <p:nvGrpSpPr>
-        <p:cNvPr id="1" name=""/>
-        <p:cNvGrpSpPr/>
-        <p:nvPr/>
-      </p:nvGrpSpPr>
-      <p:grpSpPr>
-        <a:xfrm>
-          <a:off x="0" y="0"/>
-          <a:ext cx="0" cy="0"/>
-          <a:chOff x="0" y="0"/>
-          <a:chExt cx="0" cy="0"/>
-        </a:xfrm>
-      </p:grpSpPr>
-      <p:sp>
-        <p:nvSpPr>
-          <p:cNvPr id="2" name="Header Placeholder 1"/>
-          <p:cNvSpPr>
-            <a:spLocks noGrp="1"/>
-          </p:cNvSpPr>
-          <p:nvPr>
-            <p:ph type="hdr" sz="quarter"/>
-          </p:nvPr>
-        </p:nvSpPr>
-        <p:spPr>
-          <a:xfrm>
-            <a:off x="0" y="0"/>
-            <a:ext cx="2971800" cy="457200"/>
-          </a:xfrm>
-          <a:prstGeom prst="rect">
-            <a:avLst/>
-          </a:prstGeom>
-        </p:spPr>
-        <p:txBody>
-          <a:bodyPr vert="horz" lIns="91440" tIns="45720" rIns="91440" bIns="45720" rtlCol="0"/>
-          <a:lstStyle>
-            <a:lvl1pPr algn="l">
-              <a:defRPr sz="1200"/>
-            </a:lvl1pPr>
-          </a:lstStyle>
-          <a:p>
-            <a:endParaRPr lang="en-US"/>
-          </a:p>
-        </p:txBody>
-      </p:sp>
-      <p:sp>
-        <p:nvSpPr>
-          <p:cNvPr id="3" name="Date Placeholder 2"/>
-          <p:cNvSpPr>
-            <a:spLocks noGrp="1"/>
-          </p:cNvSpPr>
-          <p:nvPr>
-            <p:ph type="dt" sz="quarter" idx="1"/>
-          </p:nvPr>
-        </p:nvSpPr>
-        <p:spPr>
-          <a:xfrm>
-            <a:off x="3884613" y="0"/>
-            <a:ext cx="2971800" cy="457200"/>
-          </a:xfrm>
-          <a:prstGeom prst="rect">
-            <a:avLst/>
-          </a:prstGeom>
-        </p:spPr>
-        <p:txBody>
-          <a:bodyPr vert="horz" lIns="91440" tIns="45720" rIns="91440" bIns="45720" rtlCol="0"/>
-          <a:lstStyle>
-            <a:lvl1pPr algn="r">
-              <a:defRPr sz="1200"/>
-            </a:lvl1pPr>
-          </a:lstStyle>
-          <a:p>
-            <a:fld id="{F8D9B3D7-15CB-9343-AA49-EFB5A8F33F18}" type="datetimeFigureOut">
-              <a:rPr lang="en-US" smtClean="0"/>
-              <a:t>11/14/15</a:t>
-            </a:fld>
-            <a:endParaRPr lang="en-US"/>
-          </a:p>
-        </p:txBody>
-      </p:sp>
-      <p:sp>
-        <p:nvSpPr>
-          <p:cNvPr id="4" name="Footer Placeholder 3"/>
-          <p:cNvSpPr>
-            <a:spLocks noGrp="1"/>
-          </p:cNvSpPr>
-          <p:nvPr>
-            <p:ph type="ftr" sz="quarter" idx="2"/>
-          </p:nvPr>
-        </p:nvSpPr>
-        <p:spPr>
-          <a:xfrm>
-            <a:off x="0" y="8685213"/>
-            <a:ext cx="2971800" cy="457200"/>
-          </a:xfrm>
-          <a:prstGeom prst="rect">
-            <a:avLst/>
-          </a:prstGeom>
-        </p:spPr>
-        <p:txBody>
-          <a:bodyPr vert="horz" lIns="91440" tIns="45720" rIns="91440" bIns="45720" rtlCol="0" anchor="b"/>
-          <a:lstStyle>
-            <a:lvl1pPr algn="l">
-              <a:defRPr sz="1200"/>
-            </a:lvl1pPr>
-          </a:lstStyle>
-          <a:p>
-            <a:endParaRPr lang="en-US"/>
-          </a:p>
-        </p:txBody>
-      </p:sp>
-      <p:sp>
-        <p:nvSpPr>
-          <p:cNvPr id="5" name="Slide Number Placeholder 4"/>
-          <p:cNvSpPr>
-            <a:spLocks noGrp="1"/>
-          </p:cNvSpPr>
-          <p:nvPr>
-            <p:ph type="sldNum" sz="quarter" idx="3"/>
-          </p:nvPr>
-        </p:nvSpPr>
-        <p:spPr>
-          <a:xfrm>
-            <a:off x="3884613" y="8685213"/>
-            <a:ext cx="2971800" cy="457200"/>
-          </a:xfrm>
-          <a:prstGeom prst="rect">
-            <a:avLst/>
-          </a:prstGeom>
-        </p:spPr>
-        <p:txBody>
-          <a:bodyPr vert="horz" lIns="91440" tIns="45720" rIns="91440" bIns="45720" rtlCol="0" anchor="b"/>
-          <a:lstStyle>
-            <a:lvl1pPr algn="r">
-              <a:defRPr sz="1200"/>
-            </a:lvl1pPr>
-          </a:lstStyle>
-          <a:p>
-            <a:fld id="{6ED9BD6B-3536-BC44-B54A-7079C6CEB9D9}" type="slidenum">
-              <a:rPr lang="en-US" smtClean="0"/>
-              <a:t>‹#›</a:t>
-            </a:fld>
-            <a:endParaRPr lang="en-US"/>
-          </a:p>
-        </p:txBody>
-      </p:sp>
-    </p:spTree>
-    <p:extLst>
-      <p:ext uri="{BB962C8B-B14F-4D97-AF65-F5344CB8AC3E}">
-        <p14:creationId xmlns:p14="http://schemas.microsoft.com/office/powerpoint/2010/main" val="3300303276"/>
-      </p:ext>
-    </p:extLst>
-  </p:cSld>
-  <p:clrMap bg1="lt1" tx1="dk1" bg2="lt2" tx2="dk2" accent1="accent1" accent2="accent2" accent3="accent3" accent4="accent4" accent5="accent5" accent6="accent6" hlink="hlink" folHlink="folHlink"/>
-  <p:hf hdr="0" ftr="0" dt="0"/>
-</p:handoutMaster>
 </file>
 
 <file path=ppt/notesMasters/notesMaster1.xml><?xml version="1.0" encoding="utf-8"?>
@@ -342,7 +157,7 @@
         <p:spPr>
           <a:xfrm>
             <a:off x="0" y="0"/>
-            <a:ext cx="2971800" cy="457200"/>
+            <a:ext cx="2971800" cy="458788"/>
           </a:xfrm>
           <a:prstGeom prst="rect">
             <a:avLst/>
@@ -373,7 +188,7 @@
         <p:spPr>
           <a:xfrm>
             <a:off x="3884613" y="0"/>
-            <a:ext cx="2971800" cy="457200"/>
+            <a:ext cx="2971800" cy="458788"/>
           </a:xfrm>
           <a:prstGeom prst="rect">
             <a:avLst/>
@@ -387,9 +202,9 @@
             </a:lvl1pPr>
           </a:lstStyle>
           <a:p>
-            <a:fld id="{FD3EFF1E-85A1-6640-AFB9-C38833E80A84}" type="datetimeFigureOut">
-              <a:rPr lang="en-US" smtClean="0"/>
-              <a:t>11/14/15</a:t>
+            <a:fld id="{2B8484CF-5098-F24E-8881-583515D5C406}" type="datetimeFigureOut">
+              <a:rPr lang="en-US" smtClean="0"/>
+              <a:t>7/3/16</a:t>
             </a:fld>
             <a:endParaRPr lang="en-US"/>
           </a:p>
@@ -407,8 +222,8 @@
         </p:nvSpPr>
         <p:spPr>
           <a:xfrm>
-            <a:off x="1143000" y="685800"/>
-            <a:ext cx="4572000" cy="3429000"/>
+            <a:off x="1371600" y="1143000"/>
+            <a:ext cx="4114800" cy="3086100"/>
           </a:xfrm>
           <a:prstGeom prst="rect">
             <a:avLst/>
@@ -440,8 +255,8 @@
         </p:nvSpPr>
         <p:spPr>
           <a:xfrm>
-            <a:off x="685800" y="4343400"/>
-            <a:ext cx="5486400" cy="4114800"/>
+            <a:off x="685800" y="4400550"/>
+            <a:ext cx="5486400" cy="3600450"/>
           </a:xfrm>
           <a:prstGeom prst="rect">
             <a:avLst/>
@@ -501,7 +316,7 @@
         <p:spPr>
           <a:xfrm>
             <a:off x="0" y="8685213"/>
-            <a:ext cx="2971800" cy="457200"/>
+            <a:ext cx="2971800" cy="458787"/>
           </a:xfrm>
           <a:prstGeom prst="rect">
             <a:avLst/>
@@ -532,7 +347,7 @@
         <p:spPr>
           <a:xfrm>
             <a:off x="3884613" y="8685213"/>
-            <a:ext cx="2971800" cy="457200"/>
+            <a:ext cx="2971800" cy="458787"/>
           </a:xfrm>
           <a:prstGeom prst="rect">
             <a:avLst/>
@@ -546,7 +361,7 @@
             </a:lvl1pPr>
           </a:lstStyle>
           <a:p>
-            <a:fld id="{13967457-1E83-1040-AFF7-8D09C473DBD5}" type="slidenum">
+            <a:fld id="{A6B67714-547E-8A4E-AE1C-9E3378A836DF}" type="slidenum">
               <a:rPr lang="en-US" smtClean="0"/>
               <a:t>‹#›</a:t>
             </a:fld>
@@ -557,14 +372,13 @@
     </p:spTree>
     <p:extLst>
       <p:ext uri="{BB962C8B-B14F-4D97-AF65-F5344CB8AC3E}">
-        <p14:creationId xmlns:p14="http://schemas.microsoft.com/office/powerpoint/2010/main" val="2489184269"/>
+        <p14:creationId xmlns:p14="http://schemas.microsoft.com/office/powerpoint/2010/main" val="981070342"/>
       </p:ext>
     </p:extLst>
   </p:cSld>
   <p:clrMap bg1="lt1" tx1="dk1" bg2="lt2" tx2="dk2" accent1="accent1" accent2="accent2" accent3="accent3" accent4="accent4" accent5="accent5" accent6="accent6" hlink="hlink" folHlink="folHlink"/>
-  <p:hf hdr="0" ftr="0" dt="0"/>
   <p:notesStyle>
-    <a:lvl1pPr marL="0" algn="l" defTabSz="457200" rtl="0" eaLnBrk="1" latinLnBrk="0" hangingPunct="1">
+    <a:lvl1pPr marL="0" algn="l" defTabSz="914400" rtl="0" eaLnBrk="1" latinLnBrk="0" hangingPunct="1">
       <a:defRPr sz="1200" kern="1200">
         <a:solidFill>
           <a:schemeClr val="tx1"/>
@@ -574,7 +388,7 @@
         <a:cs typeface="+mn-cs"/>
       </a:defRPr>
     </a:lvl1pPr>
-    <a:lvl2pPr marL="457200" algn="l" defTabSz="457200" rtl="0" eaLnBrk="1" latinLnBrk="0" hangingPunct="1">
+    <a:lvl2pPr marL="457200" algn="l" defTabSz="914400" rtl="0" eaLnBrk="1" latinLnBrk="0" hangingPunct="1">
       <a:defRPr sz="1200" kern="1200">
         <a:solidFill>
           <a:schemeClr val="tx1"/>
@@ -584,7 +398,7 @@
         <a:cs typeface="+mn-cs"/>
       </a:defRPr>
     </a:lvl2pPr>
-    <a:lvl3pPr marL="914400" algn="l" defTabSz="457200" rtl="0" eaLnBrk="1" latinLnBrk="0" hangingPunct="1">
+    <a:lvl3pPr marL="914400" algn="l" defTabSz="914400" rtl="0" eaLnBrk="1" latinLnBrk="0" hangingPunct="1">
       <a:defRPr sz="1200" kern="1200">
         <a:solidFill>
           <a:schemeClr val="tx1"/>
@@ -594,7 +408,7 @@
         <a:cs typeface="+mn-cs"/>
       </a:defRPr>
     </a:lvl3pPr>
-    <a:lvl4pPr marL="1371600" algn="l" defTabSz="457200" rtl="0" eaLnBrk="1" latinLnBrk="0" hangingPunct="1">
+    <a:lvl4pPr marL="1371600" algn="l" defTabSz="914400" rtl="0" eaLnBrk="1" latinLnBrk="0" hangingPunct="1">
       <a:defRPr sz="1200" kern="1200">
         <a:solidFill>
           <a:schemeClr val="tx1"/>
@@ -604,7 +418,7 @@
         <a:cs typeface="+mn-cs"/>
       </a:defRPr>
     </a:lvl4pPr>
-    <a:lvl5pPr marL="1828800" algn="l" defTabSz="457200" rtl="0" eaLnBrk="1" latinLnBrk="0" hangingPunct="1">
+    <a:lvl5pPr marL="1828800" algn="l" defTabSz="914400" rtl="0" eaLnBrk="1" latinLnBrk="0" hangingPunct="1">
       <a:defRPr sz="1200" kern="1200">
         <a:solidFill>
           <a:schemeClr val="tx1"/>
@@ -614,7 +428,7 @@
         <a:cs typeface="+mn-cs"/>
       </a:defRPr>
     </a:lvl5pPr>
-    <a:lvl6pPr marL="2286000" algn="l" defTabSz="457200" rtl="0" eaLnBrk="1" latinLnBrk="0" hangingPunct="1">
+    <a:lvl6pPr marL="2286000" algn="l" defTabSz="914400" rtl="0" eaLnBrk="1" latinLnBrk="0" hangingPunct="1">
       <a:defRPr sz="1200" kern="1200">
         <a:solidFill>
           <a:schemeClr val="tx1"/>
@@ -624,7 +438,7 @@
         <a:cs typeface="+mn-cs"/>
       </a:defRPr>
     </a:lvl6pPr>
-    <a:lvl7pPr marL="2743200" algn="l" defTabSz="457200" rtl="0" eaLnBrk="1" latinLnBrk="0" hangingPunct="1">
+    <a:lvl7pPr marL="2743200" algn="l" defTabSz="914400" rtl="0" eaLnBrk="1" latinLnBrk="0" hangingPunct="1">
       <a:defRPr sz="1200" kern="1200">
         <a:solidFill>
           <a:schemeClr val="tx1"/>
@@ -634,7 +448,7 @@
         <a:cs typeface="+mn-cs"/>
       </a:defRPr>
     </a:lvl7pPr>
-    <a:lvl8pPr marL="3200400" algn="l" defTabSz="457200" rtl="0" eaLnBrk="1" latinLnBrk="0" hangingPunct="1">
+    <a:lvl8pPr marL="3200400" algn="l" defTabSz="914400" rtl="0" eaLnBrk="1" latinLnBrk="0" hangingPunct="1">
       <a:defRPr sz="1200" kern="1200">
         <a:solidFill>
           <a:schemeClr val="tx1"/>
@@ -644,7 +458,7 @@
         <a:cs typeface="+mn-cs"/>
       </a:defRPr>
     </a:lvl8pPr>
-    <a:lvl9pPr marL="3657600" algn="l" defTabSz="457200" rtl="0" eaLnBrk="1" latinLnBrk="0" hangingPunct="1">
+    <a:lvl9pPr marL="3657600" algn="l" defTabSz="914400" rtl="0" eaLnBrk="1" latinLnBrk="0" hangingPunct="1">
       <a:defRPr sz="1200" kern="1200">
         <a:solidFill>
           <a:schemeClr val="tx1"/>
@@ -702,7 +516,7 @@
           <a:bodyPr/>
           <a:lstStyle/>
           <a:p>
-            <a:endParaRPr lang="en-US" dirty="0"/>
+            <a:endParaRPr lang="en-US"/>
           </a:p>
         </p:txBody>
       </p:sp>
@@ -721,18 +535,18 @@
           <a:bodyPr/>
           <a:lstStyle/>
           <a:p>
-            <a:fld id="{13967457-1E83-1040-AFF7-8D09C473DBD5}" type="slidenum">
+            <a:fld id="{A6B67714-547E-8A4E-AE1C-9E3378A836DF}" type="slidenum">
               <a:rPr lang="en-US" smtClean="0"/>
               <a:t>1</a:t>
             </a:fld>
-            <a:endParaRPr lang="en-US" dirty="0"/>
+            <a:endParaRPr lang="en-US"/>
           </a:p>
         </p:txBody>
       </p:sp>
     </p:spTree>
     <p:extLst>
       <p:ext uri="{BB962C8B-B14F-4D97-AF65-F5344CB8AC3E}">
-        <p14:creationId xmlns:p14="http://schemas.microsoft.com/office/powerpoint/2010/main" val="1709352181"/>
+        <p14:creationId xmlns:p14="http://schemas.microsoft.com/office/powerpoint/2010/main" val="99702444"/>
       </p:ext>
     </p:extLst>
   </p:cSld>
@@ -816,7 +630,7 @@
     </p:spTree>
     <p:extLst>
       <p:ext uri="{BB962C8B-B14F-4D97-AF65-F5344CB8AC3E}">
-        <p14:creationId xmlns:p14="http://schemas.microsoft.com/office/powerpoint/2010/main" val="186138344"/>
+        <p14:creationId xmlns:p14="http://schemas.microsoft.com/office/powerpoint/2010/main" val="1716998324"/>
       </p:ext>
     </p:extLst>
   </p:cSld>
@@ -889,6 +703,90 @@
           <a:bodyPr/>
           <a:lstStyle/>
           <a:p>
+            <a:fld id="{A6B67714-547E-8A4E-AE1C-9E3378A836DF}" type="slidenum">
+              <a:rPr lang="en-US" smtClean="0"/>
+              <a:t>5</a:t>
+            </a:fld>
+            <a:endParaRPr lang="en-US"/>
+          </a:p>
+        </p:txBody>
+      </p:sp>
+    </p:spTree>
+    <p:extLst>
+      <p:ext uri="{BB962C8B-B14F-4D97-AF65-F5344CB8AC3E}">
+        <p14:creationId xmlns:p14="http://schemas.microsoft.com/office/powerpoint/2010/main" val="2053483770"/>
+      </p:ext>
+    </p:extLst>
+  </p:cSld>
+  <p:clrMapOvr>
+    <a:masterClrMapping/>
+  </p:clrMapOvr>
+</p:notes>
+</file>
+
+<file path=ppt/notesSlides/notesSlide4.xml><?xml version="1.0" encoding="utf-8"?>
+<p:notes xmlns:a="http://schemas.openxmlformats.org/drawingml/2006/main" xmlns:r="http://schemas.openxmlformats.org/officeDocument/2006/relationships" xmlns:p="http://schemas.openxmlformats.org/presentationml/2006/main">
+  <p:cSld>
+    <p:spTree>
+      <p:nvGrpSpPr>
+        <p:cNvPr id="1" name=""/>
+        <p:cNvGrpSpPr/>
+        <p:nvPr/>
+      </p:nvGrpSpPr>
+      <p:grpSpPr>
+        <a:xfrm>
+          <a:off x="0" y="0"/>
+          <a:ext cx="0" cy="0"/>
+          <a:chOff x="0" y="0"/>
+          <a:chExt cx="0" cy="0"/>
+        </a:xfrm>
+      </p:grpSpPr>
+      <p:sp>
+        <p:nvSpPr>
+          <p:cNvPr id="2" name="Slide Image Placeholder 1"/>
+          <p:cNvSpPr>
+            <a:spLocks noGrp="1" noRot="1" noChangeAspect="1"/>
+          </p:cNvSpPr>
+          <p:nvPr>
+            <p:ph type="sldImg"/>
+          </p:nvPr>
+        </p:nvSpPr>
+        <p:spPr/>
+      </p:sp>
+      <p:sp>
+        <p:nvSpPr>
+          <p:cNvPr id="3" name="Notes Placeholder 2"/>
+          <p:cNvSpPr>
+            <a:spLocks noGrp="1"/>
+          </p:cNvSpPr>
+          <p:nvPr>
+            <p:ph type="body" idx="1"/>
+          </p:nvPr>
+        </p:nvSpPr>
+        <p:spPr/>
+        <p:txBody>
+          <a:bodyPr/>
+          <a:lstStyle/>
+          <a:p>
+            <a:endParaRPr lang="en-US"/>
+          </a:p>
+        </p:txBody>
+      </p:sp>
+      <p:sp>
+        <p:nvSpPr>
+          <p:cNvPr id="4" name="Slide Number Placeholder 3"/>
+          <p:cNvSpPr>
+            <a:spLocks noGrp="1"/>
+          </p:cNvSpPr>
+          <p:nvPr>
+            <p:ph type="sldNum" sz="quarter" idx="10"/>
+          </p:nvPr>
+        </p:nvSpPr>
+        <p:spPr/>
+        <p:txBody>
+          <a:bodyPr/>
+          <a:lstStyle/>
+          <a:p>
             <a:fld id="{13967457-1E83-1040-AFF7-8D09C473DBD5}" type="slidenum">
               <a:rPr lang="en-US" smtClean="0"/>
               <a:t>8</a:t>
@@ -900,7 +798,7 @@
     </p:spTree>
     <p:extLst>
       <p:ext uri="{BB962C8B-B14F-4D97-AF65-F5344CB8AC3E}">
-        <p14:creationId xmlns:p14="http://schemas.microsoft.com/office/powerpoint/2010/main" val="1846326872"/>
+        <p14:creationId xmlns:p14="http://schemas.microsoft.com/office/powerpoint/2010/main" val="1543621229"/>
       </p:ext>
     </p:extLst>
   </p:cSld>
@@ -911,7 +809,7 @@
 </file>
 
 <file path=ppt/slideLayouts/slideLayout1.xml><?xml version="1.0" encoding="utf-8"?>
-<p:sldLayout xmlns:a="http://schemas.openxmlformats.org/drawingml/2006/main" xmlns:r="http://schemas.openxmlformats.org/officeDocument/2006/relationships" xmlns:p="http://schemas.openxmlformats.org/presentationml/2006/main" showMasterSp="0" type="title" preserve="1">
+<p:sldLayout xmlns:a="http://schemas.openxmlformats.org/drawingml/2006/main" xmlns:r="http://schemas.openxmlformats.org/officeDocument/2006/relationships" xmlns:p="http://schemas.openxmlformats.org/presentationml/2006/main" showMasterSp="0" preserve="1">
   <p:cSld name="Title Slide">
     <p:spTree>
       <p:nvGrpSpPr>
@@ -929,67 +827,26 @@
       </p:grpSpPr>
       <p:sp>
         <p:nvSpPr>
-          <p:cNvPr id="2" name="Title 1"/>
-          <p:cNvSpPr>
-            <a:spLocks noGrp="1"/>
-          </p:cNvSpPr>
-          <p:nvPr>
-            <p:ph type="ctrTitle"/>
-          </p:nvPr>
-        </p:nvSpPr>
-        <p:spPr>
-          <a:xfrm>
-            <a:off x="457200" y="228600"/>
-            <a:ext cx="7772400" cy="4571999"/>
-          </a:xfrm>
-        </p:spPr>
-        <p:txBody>
-          <a:bodyPr anchor="ctr">
-            <a:noAutofit/>
-          </a:bodyPr>
+          <p:cNvPr id="3" name="Subtitle 2"/>
+          <p:cNvSpPr>
+            <a:spLocks noGrp="1"/>
+          </p:cNvSpPr>
+          <p:nvPr>
+            <p:ph type="subTitle" idx="1"/>
+          </p:nvPr>
+        </p:nvSpPr>
+        <p:spPr>
+          <a:xfrm>
+            <a:off x="1132517" y="3427224"/>
+            <a:ext cx="6858000" cy="914400"/>
+          </a:xfrm>
+        </p:spPr>
+        <p:txBody>
+          <a:bodyPr/>
           <a:lstStyle>
-            <a:lvl1pPr>
-              <a:lnSpc>
-                <a:spcPct val="100000"/>
-              </a:lnSpc>
-              <a:defRPr sz="8800" spc="-80" baseline="0">
-                <a:solidFill>
-                  <a:schemeClr val="tx1"/>
-                </a:solidFill>
-              </a:defRPr>
-            </a:lvl1pPr>
-          </a:lstStyle>
-          <a:p>
-            <a:r>
-              <a:rPr lang="en-US" smtClean="0"/>
-              <a:t>Click to edit Master title style</a:t>
-            </a:r>
-            <a:endParaRPr lang="en-US" dirty="0"/>
-          </a:p>
-        </p:txBody>
-      </p:sp>
-      <p:sp>
-        <p:nvSpPr>
-          <p:cNvPr id="3" name="Subtitle 2"/>
-          <p:cNvSpPr>
-            <a:spLocks noGrp="1"/>
-          </p:cNvSpPr>
-          <p:nvPr>
-            <p:ph type="subTitle" idx="1"/>
-          </p:nvPr>
-        </p:nvSpPr>
-        <p:spPr>
-          <a:xfrm>
-            <a:off x="457200" y="4800600"/>
-            <a:ext cx="6858000" cy="914400"/>
-          </a:xfrm>
-        </p:spPr>
-        <p:txBody>
-          <a:bodyPr/>
-          <a:lstStyle>
-            <a:lvl1pPr marL="0" indent="0" algn="l">
+            <a:lvl1pPr marL="0" indent="0" algn="ctr">
               <a:buNone/>
-              <a:defRPr b="0" cap="all" spc="120" baseline="0">
+              <a:defRPr b="0" cap="none" spc="120" baseline="0">
                 <a:solidFill>
                   <a:schemeClr val="tx2"/>
                 </a:solidFill>
@@ -1088,52 +945,34 @@
       </p:sp>
       <p:sp>
         <p:nvSpPr>
-          <p:cNvPr id="4" name="Date Placeholder 3"/>
-          <p:cNvSpPr>
-            <a:spLocks noGrp="1"/>
-          </p:cNvSpPr>
-          <p:nvPr>
-            <p:ph type="dt" sz="half" idx="10"/>
-          </p:nvPr>
-        </p:nvSpPr>
-        <p:spPr/>
-        <p:txBody>
-          <a:bodyPr/>
-          <a:lstStyle/>
-          <a:p>
-            <a:fld id="{EACB2B30-379C-4202-B1F3-D3B522878603}" type="datetime1">
-              <a:rPr lang="en-US" smtClean="0"/>
-              <a:t>11/14/15</a:t>
-            </a:fld>
+          <p:cNvPr id="5" name="Footer Placeholder 4"/>
+          <p:cNvSpPr>
+            <a:spLocks noGrp="1"/>
+          </p:cNvSpPr>
+          <p:nvPr>
+            <p:ph type="ftr" sz="quarter" idx="11"/>
+          </p:nvPr>
+        </p:nvSpPr>
+        <p:spPr>
+          <a:xfrm>
+            <a:off x="457200" y="6492877"/>
+            <a:ext cx="4208318" cy="282095"/>
+          </a:xfrm>
+        </p:spPr>
+        <p:txBody>
+          <a:bodyPr/>
+          <a:lstStyle/>
+          <a:p>
+            <a:r>
+              <a:rPr lang="en-US" smtClean="0"/>
+              <a:t>Copyright © EV3Lessons.com 2016 (Last edit: 07/04/2016)</a:t>
+            </a:r>
             <a:endParaRPr lang="en-US"/>
           </a:p>
         </p:txBody>
       </p:sp>
       <p:sp>
         <p:nvSpPr>
-          <p:cNvPr id="5" name="Footer Placeholder 4"/>
-          <p:cNvSpPr>
-            <a:spLocks noGrp="1"/>
-          </p:cNvSpPr>
-          <p:nvPr>
-            <p:ph type="ftr" sz="quarter" idx="11"/>
-          </p:nvPr>
-        </p:nvSpPr>
-        <p:spPr/>
-        <p:txBody>
-          <a:bodyPr/>
-          <a:lstStyle/>
-          <a:p>
-            <a:r>
-              <a:rPr lang="en-US" smtClean="0"/>
-              <a:t>Copyright © EV3Lessons.com 2015 (Last edit: 2/26/2015)</a:t>
-            </a:r>
-            <a:endParaRPr lang="en-US"/>
-          </a:p>
-        </p:txBody>
-      </p:sp>
-      <p:sp>
-        <p:nvSpPr>
           <p:cNvPr id="6" name="Slide Number Placeholder 5"/>
           <p:cNvSpPr>
             <a:spLocks noGrp="1"/>
@@ -1144,7 +983,7 @@
         </p:nvSpPr>
         <p:spPr>
           <a:xfrm>
-            <a:off x="8484242" y="6341733"/>
+            <a:off x="8484243" y="6341735"/>
             <a:ext cx="588319" cy="365125"/>
           </a:xfrm>
           <a:prstGeom prst="rect">
@@ -1163,11 +1002,11 @@
             </a:lvl1pPr>
           </a:lstStyle>
           <a:p>
-            <a:fld id="{4DBC7FC8-25FB-FC45-8177-2B991DA6778C}" type="slidenum">
+            <a:fld id="{BBD74847-7BE4-4E4D-8159-51DF7B93C616}" type="slidenum">
               <a:rPr lang="en-US" smtClean="0"/>
               <a:t>‹#›</a:t>
             </a:fld>
-            <a:endParaRPr lang="en-US" dirty="0"/>
+            <a:endParaRPr lang="en-US"/>
           </a:p>
         </p:txBody>
       </p:sp>
@@ -1175,11 +1014,11 @@
         <p:nvSpPr>
           <p:cNvPr id="11" name="Rectangle 10"/>
           <p:cNvSpPr/>
-          <p:nvPr userDrawn="1"/>
-        </p:nvSpPr>
-        <p:spPr>
-          <a:xfrm>
-            <a:off x="8996106" y="2895600"/>
+          <p:nvPr/>
+        </p:nvSpPr>
+        <p:spPr>
+          <a:xfrm>
+            <a:off x="8996107" y="2895600"/>
             <a:ext cx="147895" cy="3962400"/>
           </a:xfrm>
           <a:prstGeom prst="rect">
@@ -1213,7 +1052,7 @@
         <p:nvSpPr>
           <p:cNvPr id="12" name="Rectangle 11"/>
           <p:cNvSpPr/>
-          <p:nvPr userDrawn="1"/>
+          <p:nvPr/>
         </p:nvSpPr>
         <p:spPr>
           <a:xfrm>
@@ -1251,7 +1090,7 @@
         <p:nvSpPr>
           <p:cNvPr id="13" name="Rectangle 12"/>
           <p:cNvSpPr/>
-          <p:nvPr userDrawn="1"/>
+          <p:nvPr/>
         </p:nvSpPr>
         <p:spPr>
           <a:xfrm>
@@ -1285,7 +1124,123 @@
           </a:fontRef>
         </p:style>
       </p:sp>
+      <p:pic>
+        <p:nvPicPr>
+          <p:cNvPr id="10" name="Picture 2" descr="EV3Lessons.com"/>
+          <p:cNvPicPr>
+            <a:picLocks noChangeAspect="1" noChangeArrowheads="1"/>
+          </p:cNvPicPr>
+          <p:nvPr/>
+        </p:nvPicPr>
+        <p:blipFill>
+          <a:blip r:embed="rId2">
+            <a:extLst>
+              <a:ext uri="{28A0092B-C50C-407E-A947-70E740481C1C}">
+                <a14:useLocalDpi xmlns:a14="http://schemas.microsoft.com/office/drawing/2010/main" val="0"/>
+              </a:ext>
+            </a:extLst>
+          </a:blip>
+          <a:srcRect/>
+          <a:stretch>
+            <a:fillRect/>
+          </a:stretch>
+        </p:blipFill>
+        <p:spPr bwMode="auto">
+          <a:xfrm>
+            <a:off x="690897" y="400415"/>
+            <a:ext cx="7741243" cy="2875320"/>
+          </a:xfrm>
+          <a:prstGeom prst="rect">
+            <a:avLst/>
+          </a:prstGeom>
+          <a:noFill/>
+          <a:extLst>
+            <a:ext uri="{909E8E84-426E-40dd-AFC4-6F175D3DCCD1}">
+              <a14:hiddenFill xmlns="" xmlns:a14="http://schemas.microsoft.com/office/drawing/2010/main">
+                <a:solidFill>
+                  <a:srgbClr val="FFFFFF"/>
+                </a:solidFill>
+              </a14:hiddenFill>
+            </a:ext>
+          </a:extLst>
+        </p:spPr>
+      </p:pic>
+      <p:sp>
+        <p:nvSpPr>
+          <p:cNvPr id="14" name="Title 1"/>
+          <p:cNvSpPr>
+            <a:spLocks noGrp="1"/>
+          </p:cNvSpPr>
+          <p:nvPr>
+            <p:ph type="ctrTitle"/>
+          </p:nvPr>
+        </p:nvSpPr>
+        <p:spPr>
+          <a:xfrm>
+            <a:off x="502904" y="5741852"/>
+            <a:ext cx="8117227" cy="602769"/>
+          </a:xfrm>
+        </p:spPr>
+        <p:txBody>
+          <a:bodyPr>
+            <a:noAutofit/>
+          </a:bodyPr>
+          <a:lstStyle>
+            <a:lvl1pPr>
+              <a:defRPr sz="2800"/>
+            </a:lvl1pPr>
+          </a:lstStyle>
+          <a:p>
+            <a:pPr algn="ctr"/>
+            <a:r>
+              <a:rPr lang="en-US" sz="3200" dirty="0" smtClean="0"/>
+              <a:t>Click to edit Master title style</a:t>
+            </a:r>
+            <a:endParaRPr lang="en-US" sz="3200" dirty="0"/>
+          </a:p>
+        </p:txBody>
+      </p:sp>
+      <p:sp>
+        <p:nvSpPr>
+          <p:cNvPr id="15" name="TextBox 14"/>
+          <p:cNvSpPr txBox="1"/>
+          <p:nvPr/>
+        </p:nvSpPr>
+        <p:spPr>
+          <a:xfrm>
+            <a:off x="2078569" y="4119917"/>
+            <a:ext cx="4965896" cy="369332"/>
+          </a:xfrm>
+          <a:prstGeom prst="rect">
+            <a:avLst/>
+          </a:prstGeom>
+          <a:noFill/>
+        </p:spPr>
+        <p:txBody>
+          <a:bodyPr wrap="square" rtlCol="0">
+            <a:spAutoFit/>
+          </a:bodyPr>
+          <a:lstStyle/>
+          <a:p>
+            <a:pPr algn="ctr"/>
+            <a:r>
+              <a:rPr lang="en-US" sz="1800" dirty="0" smtClean="0"/>
+              <a:t>By Sanjay and Arvind </a:t>
+            </a:r>
+            <a:r>
+              <a:rPr lang="en-US" sz="1800" dirty="0" err="1" smtClean="0"/>
+              <a:t>Seshan</a:t>
+            </a:r>
+            <a:endParaRPr lang="en-US" sz="1800" dirty="0"/>
+          </a:p>
+        </p:txBody>
+      </p:sp>
     </p:spTree>
+    <p:extLst>
+      <p:ext uri="{BB962C8B-B14F-4D97-AF65-F5344CB8AC3E}">
+        <p14:creationId xmlns:p14="http://schemas.microsoft.com/office/powerpoint/2010/main" val="174918830"/>
+      </p:ext>
+    </p:extLst>
   </p:cSld>
   <p:clrMapOvr>
     <a:masterClrMapping/>
@@ -1402,56 +1357,10 @@
             <p:ph type="dt" sz="half" idx="10"/>
           </p:nvPr>
         </p:nvSpPr>
-        <p:spPr/>
-        <p:txBody>
-          <a:bodyPr/>
-          <a:lstStyle/>
-          <a:p>
-            <a:fld id="{9712A3EB-3DEA-48FE-9BFC-EC2522B74ADE}" type="datetime1">
-              <a:rPr lang="en-US" smtClean="0"/>
-              <a:t>11/14/15</a:t>
-            </a:fld>
-            <a:endParaRPr lang="en-US"/>
-          </a:p>
-        </p:txBody>
-      </p:sp>
-      <p:sp>
-        <p:nvSpPr>
-          <p:cNvPr id="5" name="Footer Placeholder 4"/>
-          <p:cNvSpPr>
-            <a:spLocks noGrp="1"/>
-          </p:cNvSpPr>
-          <p:nvPr>
-            <p:ph type="ftr" sz="quarter" idx="11"/>
-          </p:nvPr>
-        </p:nvSpPr>
-        <p:spPr/>
-        <p:txBody>
-          <a:bodyPr/>
-          <a:lstStyle/>
-          <a:p>
-            <a:r>
-              <a:rPr lang="en-US" smtClean="0"/>
-              <a:t>Copyright © EV3Lessons.com 2015 (Last edit: 2/26/2015)</a:t>
-            </a:r>
-            <a:endParaRPr lang="en-US"/>
-          </a:p>
-        </p:txBody>
-      </p:sp>
-      <p:sp>
-        <p:nvSpPr>
-          <p:cNvPr id="6" name="Slide Number Placeholder 5"/>
-          <p:cNvSpPr>
-            <a:spLocks noGrp="1"/>
-          </p:cNvSpPr>
-          <p:nvPr>
-            <p:ph type="sldNum" sz="quarter" idx="12"/>
-          </p:nvPr>
-        </p:nvSpPr>
-        <p:spPr>
-          <a:xfrm rot="16200000">
-            <a:off x="8227377" y="5885497"/>
-            <a:ext cx="1315721" cy="365125"/>
+        <p:spPr>
+          <a:xfrm>
+            <a:off x="457200" y="6172201"/>
+            <a:ext cx="3429000" cy="304800"/>
           </a:xfrm>
           <a:prstGeom prst="rect">
             <a:avLst/>
@@ -1461,7 +1370,61 @@
           <a:bodyPr/>
           <a:lstStyle/>
           <a:p>
-            <a:fld id="{4DBC7FC8-25FB-FC45-8177-2B991DA6778C}" type="slidenum">
+            <a:fld id="{A0D7D6FF-7806-AF4B-A283-BAC314E28DA7}" type="datetime1">
+              <a:rPr lang="en-US" smtClean="0"/>
+              <a:t>7/3/16</a:t>
+            </a:fld>
+            <a:endParaRPr lang="en-US"/>
+          </a:p>
+        </p:txBody>
+      </p:sp>
+      <p:sp>
+        <p:nvSpPr>
+          <p:cNvPr id="5" name="Footer Placeholder 4"/>
+          <p:cNvSpPr>
+            <a:spLocks noGrp="1"/>
+          </p:cNvSpPr>
+          <p:nvPr>
+            <p:ph type="ftr" sz="quarter" idx="11"/>
+          </p:nvPr>
+        </p:nvSpPr>
+        <p:spPr/>
+        <p:txBody>
+          <a:bodyPr/>
+          <a:lstStyle/>
+          <a:p>
+            <a:r>
+              <a:rPr lang="en-US" smtClean="0"/>
+              <a:t>Copyright © EV3Lessons.com 2016 (Last edit: 07/04/2016)</a:t>
+            </a:r>
+            <a:endParaRPr lang="en-US"/>
+          </a:p>
+        </p:txBody>
+      </p:sp>
+      <p:sp>
+        <p:nvSpPr>
+          <p:cNvPr id="6" name="Slide Number Placeholder 5"/>
+          <p:cNvSpPr>
+            <a:spLocks noGrp="1"/>
+          </p:cNvSpPr>
+          <p:nvPr>
+            <p:ph type="sldNum" sz="quarter" idx="12"/>
+          </p:nvPr>
+        </p:nvSpPr>
+        <p:spPr>
+          <a:xfrm rot="16200000">
+            <a:off x="8227378" y="5885499"/>
+            <a:ext cx="1315721" cy="365125"/>
+          </a:xfrm>
+          <a:prstGeom prst="rect">
+            <a:avLst/>
+          </a:prstGeom>
+        </p:spPr>
+        <p:txBody>
+          <a:bodyPr/>
+          <a:lstStyle/>
+          <a:p>
+            <a:fld id="{BBD74847-7BE4-4E4D-8159-51DF7B93C616}" type="slidenum">
               <a:rPr lang="en-US" smtClean="0"/>
               <a:t>‹#›</a:t>
             </a:fld>
@@ -1470,6 +1433,11 @@
         </p:txBody>
       </p:sp>
     </p:spTree>
+    <p:extLst>
+      <p:ext uri="{BB962C8B-B14F-4D97-AF65-F5344CB8AC3E}">
+        <p14:creationId xmlns:p14="http://schemas.microsoft.com/office/powerpoint/2010/main" val="1142773486"/>
+      </p:ext>
+    </p:extLst>
   </p:cSld>
   <p:clrMapOvr>
     <a:masterClrMapping/>
@@ -1506,7 +1474,7 @@
         </p:nvSpPr>
         <p:spPr>
           <a:xfrm>
-            <a:off x="6629400" y="274638"/>
+            <a:off x="6629400" y="274640"/>
             <a:ext cx="2057400" cy="5851525"/>
           </a:xfrm>
         </p:spPr>
@@ -1534,7 +1502,7 @@
         </p:nvSpPr>
         <p:spPr>
           <a:xfrm>
-            <a:off x="457200" y="274638"/>
+            <a:off x="457200" y="274640"/>
             <a:ext cx="6019800" cy="5851525"/>
           </a:xfrm>
         </p:spPr>
@@ -1589,56 +1557,10 @@
             <p:ph type="dt" sz="half" idx="10"/>
           </p:nvPr>
         </p:nvSpPr>
-        <p:spPr/>
-        <p:txBody>
-          <a:bodyPr/>
-          <a:lstStyle/>
-          <a:p>
-            <a:fld id="{70B33115-2338-48F2-AC41-157C6B87719A}" type="datetime1">
-              <a:rPr lang="en-US" smtClean="0"/>
-              <a:t>11/14/15</a:t>
-            </a:fld>
-            <a:endParaRPr lang="en-US"/>
-          </a:p>
-        </p:txBody>
-      </p:sp>
-      <p:sp>
-        <p:nvSpPr>
-          <p:cNvPr id="5" name="Footer Placeholder 4"/>
-          <p:cNvSpPr>
-            <a:spLocks noGrp="1"/>
-          </p:cNvSpPr>
-          <p:nvPr>
-            <p:ph type="ftr" sz="quarter" idx="11"/>
-          </p:nvPr>
-        </p:nvSpPr>
-        <p:spPr/>
-        <p:txBody>
-          <a:bodyPr/>
-          <a:lstStyle/>
-          <a:p>
-            <a:r>
-              <a:rPr lang="en-US" smtClean="0"/>
-              <a:t>Copyright © EV3Lessons.com 2015 (Last edit: 2/26/2015)</a:t>
-            </a:r>
-            <a:endParaRPr lang="en-US"/>
-          </a:p>
-        </p:txBody>
-      </p:sp>
-      <p:sp>
-        <p:nvSpPr>
-          <p:cNvPr id="6" name="Slide Number Placeholder 5"/>
-          <p:cNvSpPr>
-            <a:spLocks noGrp="1"/>
-          </p:cNvSpPr>
-          <p:nvPr>
-            <p:ph type="sldNum" sz="quarter" idx="12"/>
-          </p:nvPr>
-        </p:nvSpPr>
-        <p:spPr>
-          <a:xfrm rot="16200000">
-            <a:off x="8227377" y="5885497"/>
-            <a:ext cx="1315721" cy="365125"/>
+        <p:spPr>
+          <a:xfrm>
+            <a:off x="457200" y="6172201"/>
+            <a:ext cx="3429000" cy="304800"/>
           </a:xfrm>
           <a:prstGeom prst="rect">
             <a:avLst/>
@@ -1648,7 +1570,61 @@
           <a:bodyPr/>
           <a:lstStyle/>
           <a:p>
-            <a:fld id="{4DBC7FC8-25FB-FC45-8177-2B991DA6778C}" type="slidenum">
+            <a:fld id="{5C82B57B-AED5-6540-96EE-44753627E99C}" type="datetime1">
+              <a:rPr lang="en-US" smtClean="0"/>
+              <a:t>7/3/16</a:t>
+            </a:fld>
+            <a:endParaRPr lang="en-US"/>
+          </a:p>
+        </p:txBody>
+      </p:sp>
+      <p:sp>
+        <p:nvSpPr>
+          <p:cNvPr id="5" name="Footer Placeholder 4"/>
+          <p:cNvSpPr>
+            <a:spLocks noGrp="1"/>
+          </p:cNvSpPr>
+          <p:nvPr>
+            <p:ph type="ftr" sz="quarter" idx="11"/>
+          </p:nvPr>
+        </p:nvSpPr>
+        <p:spPr/>
+        <p:txBody>
+          <a:bodyPr/>
+          <a:lstStyle/>
+          <a:p>
+            <a:r>
+              <a:rPr lang="en-US" smtClean="0"/>
+              <a:t>Copyright © EV3Lessons.com 2016 (Last edit: 07/04/2016)</a:t>
+            </a:r>
+            <a:endParaRPr lang="en-US"/>
+          </a:p>
+        </p:txBody>
+      </p:sp>
+      <p:sp>
+        <p:nvSpPr>
+          <p:cNvPr id="6" name="Slide Number Placeholder 5"/>
+          <p:cNvSpPr>
+            <a:spLocks noGrp="1"/>
+          </p:cNvSpPr>
+          <p:nvPr>
+            <p:ph type="sldNum" sz="quarter" idx="12"/>
+          </p:nvPr>
+        </p:nvSpPr>
+        <p:spPr>
+          <a:xfrm rot="16200000">
+            <a:off x="8227378" y="5885499"/>
+            <a:ext cx="1315721" cy="365125"/>
+          </a:xfrm>
+          <a:prstGeom prst="rect">
+            <a:avLst/>
+          </a:prstGeom>
+        </p:spPr>
+        <p:txBody>
+          <a:bodyPr/>
+          <a:lstStyle/>
+          <a:p>
+            <a:fld id="{BBD74847-7BE4-4E4D-8159-51DF7B93C616}" type="slidenum">
               <a:rPr lang="en-US" smtClean="0"/>
               <a:t>‹#›</a:t>
             </a:fld>
@@ -1657,6 +1633,11 @@
         </p:txBody>
       </p:sp>
     </p:spTree>
+    <p:extLst>
+      <p:ext uri="{BB962C8B-B14F-4D97-AF65-F5344CB8AC3E}">
+        <p14:creationId xmlns:p14="http://schemas.microsoft.com/office/powerpoint/2010/main" val="1647724081"/>
+      </p:ext>
+    </p:extLst>
   </p:cSld>
   <p:clrMapOvr>
     <a:masterClrMapping/>
@@ -1793,9 +1774,9 @@
           <a:bodyPr/>
           <a:lstStyle/>
           <a:p>
-            <a:fld id="{52E4F7A2-CC09-4E29-8283-AB801139ECC9}" type="datetime1">
-              <a:rPr lang="en-US" smtClean="0"/>
-              <a:t>11/14/15</a:t>
+            <a:fld id="{9D36287D-4E32-8345-A988-A637E9BA65B0}" type="datetime1">
+              <a:rPr lang="en-US" smtClean="0"/>
+              <a:t>7/3/16</a:t>
             </a:fld>
             <a:endParaRPr lang="en-US"/>
           </a:p>
@@ -1818,7 +1799,7 @@
           <a:p>
             <a:r>
               <a:rPr lang="en-US" smtClean="0"/>
-              <a:t>Copyright © EV3Lessons.com 2015 (Last edit: 2/26/2015)</a:t>
+              <a:t>Copyright © EV3Lessons.com 2016 (Last edit: 07/04/2016)</a:t>
             </a:r>
             <a:endParaRPr lang="en-US"/>
           </a:p>
@@ -1850,7 +1831,7 @@
     </p:spTree>
     <p:extLst>
       <p:ext uri="{BB962C8B-B14F-4D97-AF65-F5344CB8AC3E}">
-        <p14:creationId xmlns:p14="http://schemas.microsoft.com/office/powerpoint/2010/main" val="1253788813"/>
+        <p14:creationId xmlns:p14="http://schemas.microsoft.com/office/powerpoint/2010/main" val="691542357"/>
       </p:ext>
     </p:extLst>
   </p:cSld>
@@ -1967,9 +1948,9 @@
           <a:bodyPr/>
           <a:lstStyle/>
           <a:p>
-            <a:fld id="{DB04619B-604B-42D5-BB8F-A8BCBE6B2F1D}" type="datetime1">
-              <a:rPr lang="en-US" smtClean="0"/>
-              <a:t>11/14/15</a:t>
+            <a:fld id="{5F1480AE-EFB8-9F45-B911-9D68B05AFF42}" type="datetime1">
+              <a:rPr lang="en-US" smtClean="0"/>
+              <a:t>7/3/16</a:t>
             </a:fld>
             <a:endParaRPr lang="en-US"/>
           </a:p>
@@ -1992,7 +1973,7 @@
           <a:p>
             <a:r>
               <a:rPr lang="en-US" smtClean="0"/>
-              <a:t>Copyright © EV3Lessons.com 2015 (Last edit: 2/26/2015)</a:t>
+              <a:t>Copyright © EV3Lessons.com 2016 (Last edit: 07/04/2016)</a:t>
             </a:r>
             <a:endParaRPr lang="en-US"/>
           </a:p>
@@ -2024,7 +2005,7 @@
     </p:spTree>
     <p:extLst>
       <p:ext uri="{BB962C8B-B14F-4D97-AF65-F5344CB8AC3E}">
-        <p14:creationId xmlns:p14="http://schemas.microsoft.com/office/powerpoint/2010/main" val="909324448"/>
+        <p14:creationId xmlns:p14="http://schemas.microsoft.com/office/powerpoint/2010/main" val="570896535"/>
       </p:ext>
     </p:extLst>
   </p:cSld>
@@ -2063,7 +2044,7 @@
         </p:nvSpPr>
         <p:spPr>
           <a:xfrm>
-            <a:off x="623888" y="1709738"/>
+            <a:off x="623888" y="1709740"/>
             <a:ext cx="7886700" cy="2852737"/>
           </a:xfrm>
         </p:spPr>
@@ -2095,7 +2076,7 @@
         </p:nvSpPr>
         <p:spPr>
           <a:xfrm>
-            <a:off x="623888" y="4589463"/>
+            <a:off x="623888" y="4589465"/>
             <a:ext cx="7886700" cy="1500187"/>
           </a:xfrm>
         </p:spPr>
@@ -2217,9 +2198,9 @@
           <a:bodyPr/>
           <a:lstStyle/>
           <a:p>
-            <a:fld id="{FBDC9A95-D134-4392-8040-E268F7574361}" type="datetime1">
-              <a:rPr lang="en-US" smtClean="0"/>
-              <a:t>11/14/15</a:t>
+            <a:fld id="{A4D1A879-5430-A647-9088-98E586D38E20}" type="datetime1">
+              <a:rPr lang="en-US" smtClean="0"/>
+              <a:t>7/3/16</a:t>
             </a:fld>
             <a:endParaRPr lang="en-US"/>
           </a:p>
@@ -2242,7 +2223,7 @@
           <a:p>
             <a:r>
               <a:rPr lang="en-US" smtClean="0"/>
-              <a:t>Copyright © EV3Lessons.com 2015 (Last edit: 2/26/2015)</a:t>
+              <a:t>Copyright © EV3Lessons.com 2016 (Last edit: 07/04/2016)</a:t>
             </a:r>
             <a:endParaRPr lang="en-US"/>
           </a:p>
@@ -2274,7 +2255,7 @@
     </p:spTree>
     <p:extLst>
       <p:ext uri="{BB962C8B-B14F-4D97-AF65-F5344CB8AC3E}">
-        <p14:creationId xmlns:p14="http://schemas.microsoft.com/office/powerpoint/2010/main" val="2018590187"/>
+        <p14:creationId xmlns:p14="http://schemas.microsoft.com/office/powerpoint/2010/main" val="101128949"/>
       </p:ext>
     </p:extLst>
   </p:cSld>
@@ -2453,9 +2434,9 @@
           <a:bodyPr/>
           <a:lstStyle/>
           <a:p>
-            <a:fld id="{AC7018EF-5B37-49DF-9C9A-FBD17F454B3B}" type="datetime1">
-              <a:rPr lang="en-US" smtClean="0"/>
-              <a:t>11/14/15</a:t>
+            <a:fld id="{82C58356-0B70-AE49-83EC-FE0DFFA1272B}" type="datetime1">
+              <a:rPr lang="en-US" smtClean="0"/>
+              <a:t>7/3/16</a:t>
             </a:fld>
             <a:endParaRPr lang="en-US"/>
           </a:p>
@@ -2478,7 +2459,7 @@
           <a:p>
             <a:r>
               <a:rPr lang="en-US" smtClean="0"/>
-              <a:t>Copyright © EV3Lessons.com 2015 (Last edit: 2/26/2015)</a:t>
+              <a:t>Copyright © EV3Lessons.com 2016 (Last edit: 07/04/2016)</a:t>
             </a:r>
             <a:endParaRPr lang="en-US"/>
           </a:p>
@@ -2510,7 +2491,7 @@
     </p:spTree>
     <p:extLst>
       <p:ext uri="{BB962C8B-B14F-4D97-AF65-F5344CB8AC3E}">
-        <p14:creationId xmlns:p14="http://schemas.microsoft.com/office/powerpoint/2010/main" val="3912280948"/>
+        <p14:creationId xmlns:p14="http://schemas.microsoft.com/office/powerpoint/2010/main" val="1014681066"/>
       </p:ext>
     </p:extLst>
   </p:cSld>
@@ -2549,7 +2530,7 @@
         </p:nvSpPr>
         <p:spPr>
           <a:xfrm>
-            <a:off x="630238" y="365125"/>
+            <a:off x="630238" y="365127"/>
             <a:ext cx="7886700" cy="1325563"/>
           </a:xfrm>
         </p:spPr>
@@ -2577,7 +2558,7 @@
         </p:nvSpPr>
         <p:spPr>
           <a:xfrm>
-            <a:off x="630238" y="1681163"/>
+            <a:off x="630239" y="1681163"/>
             <a:ext cx="3868737" cy="823912"/>
           </a:xfrm>
         </p:spPr>
@@ -2642,7 +2623,7 @@
         </p:nvSpPr>
         <p:spPr>
           <a:xfrm>
-            <a:off x="630238" y="2505075"/>
+            <a:off x="630239" y="2505075"/>
             <a:ext cx="3868737" cy="3684588"/>
           </a:xfrm>
         </p:spPr>
@@ -2824,9 +2805,9 @@
           <a:bodyPr/>
           <a:lstStyle/>
           <a:p>
-            <a:fld id="{BE546CA9-EE68-465B-9E04-0F5EF2792ACB}" type="datetime1">
-              <a:rPr lang="en-US" smtClean="0"/>
-              <a:t>11/14/15</a:t>
+            <a:fld id="{12918EB3-EB6A-EB4C-9054-BF4C77D776E0}" type="datetime1">
+              <a:rPr lang="en-US" smtClean="0"/>
+              <a:t>7/3/16</a:t>
             </a:fld>
             <a:endParaRPr lang="en-US"/>
           </a:p>
@@ -2849,7 +2830,7 @@
           <a:p>
             <a:r>
               <a:rPr lang="en-US" smtClean="0"/>
-              <a:t>Copyright © EV3Lessons.com 2015 (Last edit: 2/26/2015)</a:t>
+              <a:t>Copyright © EV3Lessons.com 2016 (Last edit: 07/04/2016)</a:t>
             </a:r>
             <a:endParaRPr lang="en-US"/>
           </a:p>
@@ -2881,7 +2862,7 @@
     </p:spTree>
     <p:extLst>
       <p:ext uri="{BB962C8B-B14F-4D97-AF65-F5344CB8AC3E}">
-        <p14:creationId xmlns:p14="http://schemas.microsoft.com/office/powerpoint/2010/main" val="972148509"/>
+        <p14:creationId xmlns:p14="http://schemas.microsoft.com/office/powerpoint/2010/main" val="577035435"/>
       </p:ext>
     </p:extLst>
   </p:cSld>
@@ -2946,9 +2927,9 @@
           <a:bodyPr/>
           <a:lstStyle/>
           <a:p>
-            <a:fld id="{C520C8DF-748B-4FF9-AC64-D91D47300A50}" type="datetime1">
-              <a:rPr lang="en-US" smtClean="0"/>
-              <a:t>11/14/15</a:t>
+            <a:fld id="{1237938A-3C66-0141-AC70-BA2A5D9EE584}" type="datetime1">
+              <a:rPr lang="en-US" smtClean="0"/>
+              <a:t>7/3/16</a:t>
             </a:fld>
             <a:endParaRPr lang="en-US"/>
           </a:p>
@@ -2971,7 +2952,7 @@
           <a:p>
             <a:r>
               <a:rPr lang="en-US" smtClean="0"/>
-              <a:t>Copyright © EV3Lessons.com 2015 (Last edit: 2/26/2015)</a:t>
+              <a:t>Copyright © EV3Lessons.com 2016 (Last edit: 07/04/2016)</a:t>
             </a:r>
             <a:endParaRPr lang="en-US"/>
           </a:p>
@@ -3003,7 +2984,7 @@
     </p:spTree>
     <p:extLst>
       <p:ext uri="{BB962C8B-B14F-4D97-AF65-F5344CB8AC3E}">
-        <p14:creationId xmlns:p14="http://schemas.microsoft.com/office/powerpoint/2010/main" val="3725393119"/>
+        <p14:creationId xmlns:p14="http://schemas.microsoft.com/office/powerpoint/2010/main" val="198406193"/>
       </p:ext>
     </p:extLst>
   </p:cSld>
@@ -3045,9 +3026,9 @@
           <a:bodyPr/>
           <a:lstStyle/>
           <a:p>
-            <a:fld id="{9C1B64FC-0B07-4FCC-A4B7-2A793D98D8AF}" type="datetime1">
-              <a:rPr lang="en-US" smtClean="0"/>
-              <a:t>11/14/15</a:t>
+            <a:fld id="{5E187350-B647-5C43-BAFD-ECB486045522}" type="datetime1">
+              <a:rPr lang="en-US" smtClean="0"/>
+              <a:t>7/3/16</a:t>
             </a:fld>
             <a:endParaRPr lang="en-US"/>
           </a:p>
@@ -3070,7 +3051,7 @@
           <a:p>
             <a:r>
               <a:rPr lang="en-US" smtClean="0"/>
-              <a:t>Copyright © EV3Lessons.com 2015 (Last edit: 2/26/2015)</a:t>
+              <a:t>Copyright © EV3Lessons.com 2016 (Last edit: 07/04/2016)</a:t>
             </a:r>
             <a:endParaRPr lang="en-US"/>
           </a:p>
@@ -3102,7 +3083,7 @@
     </p:spTree>
     <p:extLst>
       <p:ext uri="{BB962C8B-B14F-4D97-AF65-F5344CB8AC3E}">
-        <p14:creationId xmlns:p14="http://schemas.microsoft.com/office/powerpoint/2010/main" val="4059073685"/>
+        <p14:creationId xmlns:p14="http://schemas.microsoft.com/office/powerpoint/2010/main" val="1718265607"/>
       </p:ext>
     </p:extLst>
   </p:cSld>
@@ -3141,7 +3122,7 @@
         </p:nvSpPr>
         <p:spPr>
           <a:xfrm>
-            <a:off x="630238" y="457200"/>
+            <a:off x="630239" y="457200"/>
             <a:ext cx="2949575" cy="1600200"/>
           </a:xfrm>
         </p:spPr>
@@ -3173,7 +3154,7 @@
         </p:nvSpPr>
         <p:spPr>
           <a:xfrm>
-            <a:off x="3887788" y="987425"/>
+            <a:off x="3887788" y="987427"/>
             <a:ext cx="4629150" cy="4873625"/>
           </a:xfrm>
         </p:spPr>
@@ -3258,7 +3239,7 @@
         </p:nvSpPr>
         <p:spPr>
           <a:xfrm>
-            <a:off x="630238" y="2057400"/>
+            <a:off x="630239" y="2057400"/>
             <a:ext cx="2949575" cy="3811588"/>
           </a:xfrm>
         </p:spPr>
@@ -3326,9 +3307,9 @@
           <a:bodyPr/>
           <a:lstStyle/>
           <a:p>
-            <a:fld id="{44C30B84-0603-4FC7-84D9-BD9D09332374}" type="datetime1">
-              <a:rPr lang="en-US" smtClean="0"/>
-              <a:t>11/14/15</a:t>
+            <a:fld id="{50442756-D57E-F34F-A19A-C5370172EE63}" type="datetime1">
+              <a:rPr lang="en-US" smtClean="0"/>
+              <a:t>7/3/16</a:t>
             </a:fld>
             <a:endParaRPr lang="en-US"/>
           </a:p>
@@ -3351,7 +3332,7 @@
           <a:p>
             <a:r>
               <a:rPr lang="en-US" smtClean="0"/>
-              <a:t>Copyright © EV3Lessons.com 2015 (Last edit: 2/26/2015)</a:t>
+              <a:t>Copyright © EV3Lessons.com 2016 (Last edit: 07/04/2016)</a:t>
             </a:r>
             <a:endParaRPr lang="en-US"/>
           </a:p>
@@ -3383,7 +3364,7 @@
     </p:spTree>
     <p:extLst>
       <p:ext uri="{BB962C8B-B14F-4D97-AF65-F5344CB8AC3E}">
-        <p14:creationId xmlns:p14="http://schemas.microsoft.com/office/powerpoint/2010/main" val="339650278"/>
+        <p14:creationId xmlns:p14="http://schemas.microsoft.com/office/powerpoint/2010/main" val="1677455640"/>
       </p:ext>
     </p:extLst>
   </p:cSld>
@@ -3422,7 +3403,7 @@
         </p:nvSpPr>
         <p:spPr>
           <a:xfrm>
-            <a:off x="457199" y="152718"/>
+            <a:off x="457200" y="152718"/>
             <a:ext cx="8245475" cy="1371600"/>
           </a:xfrm>
         </p:spPr>
@@ -3450,7 +3431,7 @@
         </p:nvSpPr>
         <p:spPr>
           <a:xfrm>
-            <a:off x="457200" y="1752600"/>
+            <a:off x="457200" y="1752602"/>
             <a:ext cx="8245474" cy="4373563"/>
           </a:xfrm>
         </p:spPr>
@@ -3505,56 +3486,10 @@
             <p:ph type="dt" sz="half" idx="10"/>
           </p:nvPr>
         </p:nvSpPr>
-        <p:spPr/>
-        <p:txBody>
-          <a:bodyPr/>
-          <a:lstStyle/>
-          <a:p>
-            <a:fld id="{DC74358E-D881-4525-B70A-DE14D094364E}" type="datetime1">
-              <a:rPr lang="en-US" smtClean="0"/>
-              <a:t>11/14/15</a:t>
-            </a:fld>
-            <a:endParaRPr lang="en-US"/>
-          </a:p>
-        </p:txBody>
-      </p:sp>
-      <p:sp>
-        <p:nvSpPr>
-          <p:cNvPr id="5" name="Footer Placeholder 4"/>
-          <p:cNvSpPr>
-            <a:spLocks noGrp="1"/>
-          </p:cNvSpPr>
-          <p:nvPr>
-            <p:ph type="ftr" sz="quarter" idx="11"/>
-          </p:nvPr>
-        </p:nvSpPr>
-        <p:spPr/>
-        <p:txBody>
-          <a:bodyPr/>
-          <a:lstStyle/>
-          <a:p>
-            <a:r>
-              <a:rPr lang="en-US" smtClean="0"/>
-              <a:t>Copyright © EV3Lessons.com 2015 (Last edit: 2/26/2015)</a:t>
-            </a:r>
-            <a:endParaRPr lang="en-US"/>
-          </a:p>
-        </p:txBody>
-      </p:sp>
-      <p:sp>
-        <p:nvSpPr>
-          <p:cNvPr id="6" name="Slide Number Placeholder 5"/>
-          <p:cNvSpPr>
-            <a:spLocks noGrp="1"/>
-          </p:cNvSpPr>
-          <p:nvPr>
-            <p:ph type="sldNum" sz="quarter" idx="12"/>
-          </p:nvPr>
-        </p:nvSpPr>
-        <p:spPr>
-          <a:xfrm>
-            <a:off x="8457383" y="6376457"/>
-            <a:ext cx="627256" cy="365125"/>
+        <p:spPr>
+          <a:xfrm>
+            <a:off x="457200" y="6172201"/>
+            <a:ext cx="3429000" cy="304800"/>
           </a:xfrm>
           <a:prstGeom prst="rect">
             <a:avLst/>
@@ -3564,7 +3499,66 @@
           <a:bodyPr/>
           <a:lstStyle/>
           <a:p>
-            <a:fld id="{4DBC7FC8-25FB-FC45-8177-2B991DA6778C}" type="slidenum">
+            <a:fld id="{7B426232-38CB-1A47-9E73-5423FFCAD209}" type="datetime1">
+              <a:rPr lang="en-US" smtClean="0"/>
+              <a:t>7/3/16</a:t>
+            </a:fld>
+            <a:endParaRPr lang="en-US"/>
+          </a:p>
+        </p:txBody>
+      </p:sp>
+      <p:sp>
+        <p:nvSpPr>
+          <p:cNvPr id="5" name="Footer Placeholder 4"/>
+          <p:cNvSpPr>
+            <a:spLocks noGrp="1"/>
+          </p:cNvSpPr>
+          <p:nvPr>
+            <p:ph type="ftr" sz="quarter" idx="11"/>
+          </p:nvPr>
+        </p:nvSpPr>
+        <p:spPr>
+          <a:xfrm>
+            <a:off x="457199" y="6492877"/>
+            <a:ext cx="3667991" cy="283845"/>
+          </a:xfrm>
+        </p:spPr>
+        <p:txBody>
+          <a:bodyPr/>
+          <a:lstStyle/>
+          <a:p>
+            <a:r>
+              <a:rPr lang="en-US" smtClean="0"/>
+              <a:t>Copyright © EV3Lessons.com 2016 (Last edit: 07/04/2016)</a:t>
+            </a:r>
+            <a:endParaRPr lang="en-US"/>
+          </a:p>
+        </p:txBody>
+      </p:sp>
+      <p:sp>
+        <p:nvSpPr>
+          <p:cNvPr id="6" name="Slide Number Placeholder 5"/>
+          <p:cNvSpPr>
+            <a:spLocks noGrp="1"/>
+          </p:cNvSpPr>
+          <p:nvPr>
+            <p:ph type="sldNum" sz="quarter" idx="12"/>
+          </p:nvPr>
+        </p:nvSpPr>
+        <p:spPr>
+          <a:xfrm>
+            <a:off x="8457384" y="6376459"/>
+            <a:ext cx="627256" cy="365125"/>
+          </a:xfrm>
+          <a:prstGeom prst="rect">
+            <a:avLst/>
+          </a:prstGeom>
+        </p:spPr>
+        <p:txBody>
+          <a:bodyPr/>
+          <a:lstStyle/>
+          <a:p>
+            <a:fld id="{BBD74847-7BE4-4E4D-8159-51DF7B93C616}" type="slidenum">
               <a:rPr lang="en-US" smtClean="0"/>
               <a:t>‹#›</a:t>
             </a:fld>
@@ -3573,6 +3567,11 @@
         </p:txBody>
       </p:sp>
     </p:spTree>
+    <p:extLst>
+      <p:ext uri="{BB962C8B-B14F-4D97-AF65-F5344CB8AC3E}">
+        <p14:creationId xmlns:p14="http://schemas.microsoft.com/office/powerpoint/2010/main" val="2103146714"/>
+      </p:ext>
+    </p:extLst>
   </p:cSld>
   <p:clrMapOvr>
     <a:masterClrMapping/>
@@ -3616,7 +3615,7 @@
         </p:nvSpPr>
         <p:spPr>
           <a:xfrm>
-            <a:off x="630238" y="457200"/>
+            <a:off x="630239" y="457200"/>
             <a:ext cx="2949575" cy="1600200"/>
           </a:xfrm>
         </p:spPr>
@@ -3648,7 +3647,7 @@
         </p:nvSpPr>
         <p:spPr>
           <a:xfrm>
-            <a:off x="3887788" y="987425"/>
+            <a:off x="3887788" y="987427"/>
             <a:ext cx="4629150" cy="4873625"/>
           </a:xfrm>
         </p:spPr>
@@ -3693,6 +3692,10 @@
             </a:lvl9pPr>
           </a:lstStyle>
           <a:p>
+            <a:r>
+              <a:rPr lang="en-US" smtClean="0"/>
+              <a:t>Drag picture to placeholder or click icon to add</a:t>
+            </a:r>
             <a:endParaRPr lang="en-US"/>
           </a:p>
         </p:txBody>
@@ -3709,7 +3712,7 @@
         </p:nvSpPr>
         <p:spPr>
           <a:xfrm>
-            <a:off x="630238" y="2057400"/>
+            <a:off x="630239" y="2057400"/>
             <a:ext cx="2949575" cy="3811588"/>
           </a:xfrm>
         </p:spPr>
@@ -3777,9 +3780,9 @@
           <a:bodyPr/>
           <a:lstStyle/>
           <a:p>
-            <a:fld id="{2F6647C5-502E-4DBE-A7FD-E03B64209305}" type="datetime1">
-              <a:rPr lang="en-US" smtClean="0"/>
-              <a:t>11/14/15</a:t>
+            <a:fld id="{04434AEA-79BF-C248-B858-8D0CDEAA1103}" type="datetime1">
+              <a:rPr lang="en-US" smtClean="0"/>
+              <a:t>7/3/16</a:t>
             </a:fld>
             <a:endParaRPr lang="en-US"/>
           </a:p>
@@ -3802,7 +3805,7 @@
           <a:p>
             <a:r>
               <a:rPr lang="en-US" smtClean="0"/>
-              <a:t>Copyright © EV3Lessons.com 2015 (Last edit: 2/26/2015)</a:t>
+              <a:t>Copyright © EV3Lessons.com 2016 (Last edit: 07/04/2016)</a:t>
             </a:r>
             <a:endParaRPr lang="en-US"/>
           </a:p>
@@ -3834,7 +3837,7 @@
     </p:spTree>
     <p:extLst>
       <p:ext uri="{BB962C8B-B14F-4D97-AF65-F5344CB8AC3E}">
-        <p14:creationId xmlns:p14="http://schemas.microsoft.com/office/powerpoint/2010/main" val="261275509"/>
+        <p14:creationId xmlns:p14="http://schemas.microsoft.com/office/powerpoint/2010/main" val="831623664"/>
       </p:ext>
     </p:extLst>
   </p:cSld>
@@ -3951,9 +3954,9 @@
           <a:bodyPr/>
           <a:lstStyle/>
           <a:p>
-            <a:fld id="{4953AC36-85B5-4E03-A156-994A603185BA}" type="datetime1">
-              <a:rPr lang="en-US" smtClean="0"/>
-              <a:t>11/14/15</a:t>
+            <a:fld id="{EEC8BB54-8E19-634E-BFE0-09D2B37A7CFC}" type="datetime1">
+              <a:rPr lang="en-US" smtClean="0"/>
+              <a:t>7/3/16</a:t>
             </a:fld>
             <a:endParaRPr lang="en-US"/>
           </a:p>
@@ -3976,7 +3979,7 @@
           <a:p>
             <a:r>
               <a:rPr lang="en-US" smtClean="0"/>
-              <a:t>Copyright © EV3Lessons.com 2015 (Last edit: 2/26/2015)</a:t>
+              <a:t>Copyright © EV3Lessons.com 2016 (Last edit: 07/04/2016)</a:t>
             </a:r>
             <a:endParaRPr lang="en-US"/>
           </a:p>
@@ -4008,7 +4011,7 @@
     </p:spTree>
     <p:extLst>
       <p:ext uri="{BB962C8B-B14F-4D97-AF65-F5344CB8AC3E}">
-        <p14:creationId xmlns:p14="http://schemas.microsoft.com/office/powerpoint/2010/main" val="551884110"/>
+        <p14:creationId xmlns:p14="http://schemas.microsoft.com/office/powerpoint/2010/main" val="1275346172"/>
       </p:ext>
     </p:extLst>
   </p:cSld>
@@ -4047,7 +4050,7 @@
         </p:nvSpPr>
         <p:spPr>
           <a:xfrm>
-            <a:off x="6543675" y="365125"/>
+            <a:off x="6543676" y="365125"/>
             <a:ext cx="1971675" cy="5811838"/>
           </a:xfrm>
         </p:spPr>
@@ -4075,7 +4078,7 @@
         </p:nvSpPr>
         <p:spPr>
           <a:xfrm>
-            <a:off x="628650" y="365125"/>
+            <a:off x="628651" y="365125"/>
             <a:ext cx="5762625" cy="5811838"/>
           </a:xfrm>
         </p:spPr>
@@ -4135,9 +4138,9 @@
           <a:bodyPr/>
           <a:lstStyle/>
           <a:p>
-            <a:fld id="{7482BB1B-B86C-463F-9D70-9FBBAE58DDBA}" type="datetime1">
-              <a:rPr lang="en-US" smtClean="0"/>
-              <a:t>11/14/15</a:t>
+            <a:fld id="{983886DE-A53D-434E-BEF9-2CF92E7B5B7E}" type="datetime1">
+              <a:rPr lang="en-US" smtClean="0"/>
+              <a:t>7/3/16</a:t>
             </a:fld>
             <a:endParaRPr lang="en-US"/>
           </a:p>
@@ -4160,7 +4163,7 @@
           <a:p>
             <a:r>
               <a:rPr lang="en-US" smtClean="0"/>
-              <a:t>Copyright © EV3Lessons.com 2015 (Last edit: 2/26/2015)</a:t>
+              <a:t>Copyright © EV3Lessons.com 2016 (Last edit: 07/04/2016)</a:t>
             </a:r>
             <a:endParaRPr lang="en-US"/>
           </a:p>
@@ -4192,7 +4195,7 @@
     </p:spTree>
     <p:extLst>
       <p:ext uri="{BB962C8B-B14F-4D97-AF65-F5344CB8AC3E}">
-        <p14:creationId xmlns:p14="http://schemas.microsoft.com/office/powerpoint/2010/main" val="1425517541"/>
+        <p14:creationId xmlns:p14="http://schemas.microsoft.com/office/powerpoint/2010/main" val="708832097"/>
       </p:ext>
     </p:extLst>
   </p:cSld>
@@ -4231,7 +4234,7 @@
         </p:nvSpPr>
         <p:spPr>
           <a:xfrm>
-            <a:off x="457200" y="1447800"/>
+            <a:off x="457200" y="1447802"/>
             <a:ext cx="7772400" cy="4321175"/>
           </a:xfrm>
         </p:spPr>
@@ -4388,33 +4391,10 @@
             <p:ph type="dt" sz="half" idx="10"/>
           </p:nvPr>
         </p:nvSpPr>
-        <p:spPr/>
-        <p:txBody>
-          <a:bodyPr/>
-          <a:lstStyle/>
-          <a:p>
-            <a:fld id="{FFFC3E62-AF39-4395-90BD-B8A775E66488}" type="datetime1">
-              <a:rPr lang="en-US" smtClean="0"/>
-              <a:t>11/14/15</a:t>
-            </a:fld>
-            <a:endParaRPr lang="en-US"/>
-          </a:p>
-        </p:txBody>
-      </p:sp>
-      <p:sp>
-        <p:nvSpPr>
-          <p:cNvPr id="8" name="Slide Number Placeholder 7"/>
-          <p:cNvSpPr>
-            <a:spLocks noGrp="1"/>
-          </p:cNvSpPr>
-          <p:nvPr>
-            <p:ph type="sldNum" sz="quarter" idx="11"/>
-          </p:nvPr>
-        </p:nvSpPr>
-        <p:spPr>
-          <a:xfrm rot="16200000">
-            <a:off x="8227377" y="5885497"/>
-            <a:ext cx="1315721" cy="365125"/>
+        <p:spPr>
+          <a:xfrm>
+            <a:off x="457200" y="6172201"/>
+            <a:ext cx="3429000" cy="304800"/>
           </a:xfrm>
           <a:prstGeom prst="rect">
             <a:avLst/>
@@ -4424,7 +4404,38 @@
           <a:bodyPr/>
           <a:lstStyle/>
           <a:p>
-            <a:fld id="{4DBC7FC8-25FB-FC45-8177-2B991DA6778C}" type="slidenum">
+            <a:fld id="{98319551-7271-E644-9B2B-7729038CAC57}" type="datetime1">
+              <a:rPr lang="en-US" smtClean="0"/>
+              <a:t>7/3/16</a:t>
+            </a:fld>
+            <a:endParaRPr lang="en-US"/>
+          </a:p>
+        </p:txBody>
+      </p:sp>
+      <p:sp>
+        <p:nvSpPr>
+          <p:cNvPr id="8" name="Slide Number Placeholder 7"/>
+          <p:cNvSpPr>
+            <a:spLocks noGrp="1"/>
+          </p:cNvSpPr>
+          <p:nvPr>
+            <p:ph type="sldNum" sz="quarter" idx="11"/>
+          </p:nvPr>
+        </p:nvSpPr>
+        <p:spPr>
+          <a:xfrm rot="16200000">
+            <a:off x="8227378" y="5885499"/>
+            <a:ext cx="1315721" cy="365125"/>
+          </a:xfrm>
+          <a:prstGeom prst="rect">
+            <a:avLst/>
+          </a:prstGeom>
+        </p:spPr>
+        <p:txBody>
+          <a:bodyPr/>
+          <a:lstStyle/>
+          <a:p>
+            <a:fld id="{BBD74847-7BE4-4E4D-8159-51DF7B93C616}" type="slidenum">
               <a:rPr lang="en-US" smtClean="0"/>
               <a:t>‹#›</a:t>
             </a:fld>
@@ -4449,13 +4460,18 @@
           <a:p>
             <a:r>
               <a:rPr lang="en-US" smtClean="0"/>
-              <a:t>Copyright © EV3Lessons.com 2015 (Last edit: 2/26/2015)</a:t>
+              <a:t>Copyright © EV3Lessons.com 2016 (Last edit: 07/04/2016)</a:t>
             </a:r>
             <a:endParaRPr lang="en-US"/>
           </a:p>
         </p:txBody>
       </p:sp>
     </p:spTree>
+    <p:extLst>
+      <p:ext uri="{BB962C8B-B14F-4D97-AF65-F5344CB8AC3E}">
+        <p14:creationId xmlns:p14="http://schemas.microsoft.com/office/powerpoint/2010/main" val="5992578"/>
+      </p:ext>
+    </p:extLst>
   </p:cSld>
   <p:clrMapOvr>
     <a:masterClrMapping/>
@@ -4492,7 +4508,7 @@
         </p:nvSpPr>
         <p:spPr>
           <a:xfrm>
-            <a:off x="457199" y="152718"/>
+            <a:off x="457200" y="152718"/>
             <a:ext cx="8245475" cy="1371600"/>
           </a:xfrm>
         </p:spPr>
@@ -4520,7 +4536,7 @@
         </p:nvSpPr>
         <p:spPr>
           <a:xfrm>
-            <a:off x="457200" y="1574800"/>
+            <a:off x="457201" y="1574800"/>
             <a:ext cx="3877529" cy="4525963"/>
           </a:xfrm>
         </p:spPr>
@@ -4605,7 +4621,7 @@
         </p:nvSpPr>
         <p:spPr>
           <a:xfrm>
-            <a:off x="4886923" y="1574800"/>
+            <a:off x="4886924" y="1574800"/>
             <a:ext cx="3815751" cy="4525963"/>
           </a:xfrm>
         </p:spPr>
@@ -4643,35 +4659,35 @@
           <a:p>
             <a:pPr lvl="0"/>
             <a:r>
-              <a:rPr lang="en-US" dirty="0" smtClean="0"/>
+              <a:rPr lang="en-US" smtClean="0"/>
               <a:t>Click to edit Master text styles</a:t>
             </a:r>
           </a:p>
           <a:p>
             <a:pPr lvl="1"/>
             <a:r>
-              <a:rPr lang="en-US" dirty="0" smtClean="0"/>
+              <a:rPr lang="en-US" smtClean="0"/>
               <a:t>Second level</a:t>
             </a:r>
           </a:p>
           <a:p>
             <a:pPr lvl="2"/>
             <a:r>
-              <a:rPr lang="en-US" dirty="0" smtClean="0"/>
+              <a:rPr lang="en-US" smtClean="0"/>
               <a:t>Third level</a:t>
             </a:r>
           </a:p>
           <a:p>
             <a:pPr lvl="3"/>
             <a:r>
-              <a:rPr lang="en-US" dirty="0" smtClean="0"/>
+              <a:rPr lang="en-US" smtClean="0"/>
               <a:t>Fourth level</a:t>
             </a:r>
           </a:p>
           <a:p>
             <a:pPr lvl="4"/>
             <a:r>
-              <a:rPr lang="en-US" dirty="0" smtClean="0"/>
+              <a:rPr lang="en-US" smtClean="0"/>
               <a:t>Fifth level</a:t>
             </a:r>
             <a:endParaRPr lang="en-US" dirty="0"/>
@@ -4688,56 +4704,10 @@
             <p:ph type="dt" sz="half" idx="10"/>
           </p:nvPr>
         </p:nvSpPr>
-        <p:spPr/>
-        <p:txBody>
-          <a:bodyPr/>
-          <a:lstStyle/>
-          <a:p>
-            <a:fld id="{26F539D2-F48F-443B-BF38-2A6C95CF6A7F}" type="datetime1">
-              <a:rPr lang="en-US" smtClean="0"/>
-              <a:t>11/14/15</a:t>
-            </a:fld>
-            <a:endParaRPr lang="en-US"/>
-          </a:p>
-        </p:txBody>
-      </p:sp>
-      <p:sp>
-        <p:nvSpPr>
-          <p:cNvPr id="6" name="Footer Placeholder 5"/>
-          <p:cNvSpPr>
-            <a:spLocks noGrp="1"/>
-          </p:cNvSpPr>
-          <p:nvPr>
-            <p:ph type="ftr" sz="quarter" idx="11"/>
-          </p:nvPr>
-        </p:nvSpPr>
-        <p:spPr/>
-        <p:txBody>
-          <a:bodyPr/>
-          <a:lstStyle/>
-          <a:p>
-            <a:r>
-              <a:rPr lang="en-US" smtClean="0"/>
-              <a:t>Copyright © EV3Lessons.com 2015 (Last edit: 2/26/2015)</a:t>
-            </a:r>
-            <a:endParaRPr lang="en-US"/>
-          </a:p>
-        </p:txBody>
-      </p:sp>
-      <p:sp>
-        <p:nvSpPr>
-          <p:cNvPr id="7" name="Slide Number Placeholder 6"/>
-          <p:cNvSpPr>
-            <a:spLocks noGrp="1"/>
-          </p:cNvSpPr>
-          <p:nvPr>
-            <p:ph type="sldNum" sz="quarter" idx="12"/>
-          </p:nvPr>
-        </p:nvSpPr>
-        <p:spPr>
-          <a:xfrm>
-            <a:off x="8477026" y="6358106"/>
-            <a:ext cx="666974" cy="365125"/>
+        <p:spPr>
+          <a:xfrm>
+            <a:off x="457200" y="6172201"/>
+            <a:ext cx="3429000" cy="304800"/>
           </a:xfrm>
           <a:prstGeom prst="rect">
             <a:avLst/>
@@ -4747,7 +4717,61 @@
           <a:bodyPr/>
           <a:lstStyle/>
           <a:p>
-            <a:fld id="{4DBC7FC8-25FB-FC45-8177-2B991DA6778C}" type="slidenum">
+            <a:fld id="{CED28D00-C264-514C-8B2F-FCB215709720}" type="datetime1">
+              <a:rPr lang="en-US" smtClean="0"/>
+              <a:t>7/3/16</a:t>
+            </a:fld>
+            <a:endParaRPr lang="en-US"/>
+          </a:p>
+        </p:txBody>
+      </p:sp>
+      <p:sp>
+        <p:nvSpPr>
+          <p:cNvPr id="6" name="Footer Placeholder 5"/>
+          <p:cNvSpPr>
+            <a:spLocks noGrp="1"/>
+          </p:cNvSpPr>
+          <p:nvPr>
+            <p:ph type="ftr" sz="quarter" idx="11"/>
+          </p:nvPr>
+        </p:nvSpPr>
+        <p:spPr/>
+        <p:txBody>
+          <a:bodyPr/>
+          <a:lstStyle/>
+          <a:p>
+            <a:r>
+              <a:rPr lang="en-US" smtClean="0"/>
+              <a:t>Copyright © EV3Lessons.com 2016 (Last edit: 07/04/2016)</a:t>
+            </a:r>
+            <a:endParaRPr lang="en-US"/>
+          </a:p>
+        </p:txBody>
+      </p:sp>
+      <p:sp>
+        <p:nvSpPr>
+          <p:cNvPr id="7" name="Slide Number Placeholder 6"/>
+          <p:cNvSpPr>
+            <a:spLocks noGrp="1"/>
+          </p:cNvSpPr>
+          <p:nvPr>
+            <p:ph type="sldNum" sz="quarter" idx="12"/>
+          </p:nvPr>
+        </p:nvSpPr>
+        <p:spPr>
+          <a:xfrm>
+            <a:off x="8477026" y="6358108"/>
+            <a:ext cx="666974" cy="365125"/>
+          </a:xfrm>
+          <a:prstGeom prst="rect">
+            <a:avLst/>
+          </a:prstGeom>
+        </p:spPr>
+        <p:txBody>
+          <a:bodyPr/>
+          <a:lstStyle/>
+          <a:p>
+            <a:fld id="{BBD74847-7BE4-4E4D-8159-51DF7B93C616}" type="slidenum">
               <a:rPr lang="en-US" smtClean="0"/>
               <a:t>‹#›</a:t>
             </a:fld>
@@ -4756,6 +4780,11 @@
         </p:txBody>
       </p:sp>
     </p:spTree>
+    <p:extLst>
+      <p:ext uri="{BB962C8B-B14F-4D97-AF65-F5344CB8AC3E}">
+        <p14:creationId xmlns:p14="http://schemas.microsoft.com/office/powerpoint/2010/main" val="1933010684"/>
+      </p:ext>
+    </p:extLst>
   </p:cSld>
   <p:clrMapOvr>
     <a:masterClrMapping/>
@@ -5146,56 +5175,10 @@
             <p:ph type="dt" sz="half" idx="10"/>
           </p:nvPr>
         </p:nvSpPr>
-        <p:spPr/>
-        <p:txBody>
-          <a:bodyPr/>
-          <a:lstStyle/>
-          <a:p>
-            <a:fld id="{F7A58AE1-8CA8-48CF-ABF4-408B23C67943}" type="datetime1">
-              <a:rPr lang="en-US" smtClean="0"/>
-              <a:t>11/14/15</a:t>
-            </a:fld>
-            <a:endParaRPr lang="en-US"/>
-          </a:p>
-        </p:txBody>
-      </p:sp>
-      <p:sp>
-        <p:nvSpPr>
-          <p:cNvPr id="8" name="Footer Placeholder 7"/>
-          <p:cNvSpPr>
-            <a:spLocks noGrp="1"/>
-          </p:cNvSpPr>
-          <p:nvPr>
-            <p:ph type="ftr" sz="quarter" idx="11"/>
-          </p:nvPr>
-        </p:nvSpPr>
-        <p:spPr/>
-        <p:txBody>
-          <a:bodyPr/>
-          <a:lstStyle/>
-          <a:p>
-            <a:r>
-              <a:rPr lang="en-US" smtClean="0"/>
-              <a:t>Copyright © EV3Lessons.com 2015 (Last edit: 2/26/2015)</a:t>
-            </a:r>
-            <a:endParaRPr lang="en-US"/>
-          </a:p>
-        </p:txBody>
-      </p:sp>
-      <p:sp>
-        <p:nvSpPr>
-          <p:cNvPr id="10" name="Slide Number Placeholder 6"/>
-          <p:cNvSpPr>
-            <a:spLocks noGrp="1"/>
-          </p:cNvSpPr>
-          <p:nvPr>
-            <p:ph type="sldNum" sz="quarter" idx="12"/>
-          </p:nvPr>
-        </p:nvSpPr>
-        <p:spPr>
-          <a:xfrm>
-            <a:off x="8477026" y="6358106"/>
-            <a:ext cx="666974" cy="365125"/>
+        <p:spPr>
+          <a:xfrm>
+            <a:off x="457200" y="6172201"/>
+            <a:ext cx="3429000" cy="304800"/>
           </a:xfrm>
           <a:prstGeom prst="rect">
             <a:avLst/>
@@ -5205,7 +5188,61 @@
           <a:bodyPr/>
           <a:lstStyle/>
           <a:p>
-            <a:fld id="{4DBC7FC8-25FB-FC45-8177-2B991DA6778C}" type="slidenum">
+            <a:fld id="{88AEB27E-BE48-A34A-B1A9-05318CF5B8B2}" type="datetime1">
+              <a:rPr lang="en-US" smtClean="0"/>
+              <a:t>7/3/16</a:t>
+            </a:fld>
+            <a:endParaRPr lang="en-US"/>
+          </a:p>
+        </p:txBody>
+      </p:sp>
+      <p:sp>
+        <p:nvSpPr>
+          <p:cNvPr id="8" name="Footer Placeholder 7"/>
+          <p:cNvSpPr>
+            <a:spLocks noGrp="1"/>
+          </p:cNvSpPr>
+          <p:nvPr>
+            <p:ph type="ftr" sz="quarter" idx="11"/>
+          </p:nvPr>
+        </p:nvSpPr>
+        <p:spPr/>
+        <p:txBody>
+          <a:bodyPr/>
+          <a:lstStyle/>
+          <a:p>
+            <a:r>
+              <a:rPr lang="en-US" smtClean="0"/>
+              <a:t>Copyright © EV3Lessons.com 2016 (Last edit: 07/04/2016)</a:t>
+            </a:r>
+            <a:endParaRPr lang="en-US"/>
+          </a:p>
+        </p:txBody>
+      </p:sp>
+      <p:sp>
+        <p:nvSpPr>
+          <p:cNvPr id="10" name="Slide Number Placeholder 6"/>
+          <p:cNvSpPr>
+            <a:spLocks noGrp="1"/>
+          </p:cNvSpPr>
+          <p:nvPr>
+            <p:ph type="sldNum" sz="quarter" idx="12"/>
+          </p:nvPr>
+        </p:nvSpPr>
+        <p:spPr>
+          <a:xfrm>
+            <a:off x="8477026" y="6358108"/>
+            <a:ext cx="666974" cy="365125"/>
+          </a:xfrm>
+          <a:prstGeom prst="rect">
+            <a:avLst/>
+          </a:prstGeom>
+        </p:spPr>
+        <p:txBody>
+          <a:bodyPr/>
+          <a:lstStyle/>
+          <a:p>
+            <a:fld id="{BBD74847-7BE4-4E4D-8159-51DF7B93C616}" type="slidenum">
               <a:rPr lang="en-US" smtClean="0"/>
               <a:t>‹#›</a:t>
             </a:fld>
@@ -5214,6 +5251,11 @@
         </p:txBody>
       </p:sp>
     </p:spTree>
+    <p:extLst>
+      <p:ext uri="{BB962C8B-B14F-4D97-AF65-F5344CB8AC3E}">
+        <p14:creationId xmlns:p14="http://schemas.microsoft.com/office/powerpoint/2010/main" val="977954172"/>
+      </p:ext>
+    </p:extLst>
   </p:cSld>
   <p:clrMapOvr>
     <a:masterClrMapping/>
@@ -5278,56 +5320,10 @@
             <p:ph type="dt" sz="half" idx="10"/>
           </p:nvPr>
         </p:nvSpPr>
-        <p:spPr/>
-        <p:txBody>
-          <a:bodyPr/>
-          <a:lstStyle/>
-          <a:p>
-            <a:fld id="{2B29D99D-AE80-4750-840C-EB9806DF3A06}" type="datetime1">
-              <a:rPr lang="en-US" smtClean="0"/>
-              <a:t>11/14/15</a:t>
-            </a:fld>
-            <a:endParaRPr lang="en-US"/>
-          </a:p>
-        </p:txBody>
-      </p:sp>
-      <p:sp>
-        <p:nvSpPr>
-          <p:cNvPr id="4" name="Footer Placeholder 3"/>
-          <p:cNvSpPr>
-            <a:spLocks noGrp="1"/>
-          </p:cNvSpPr>
-          <p:nvPr>
-            <p:ph type="ftr" sz="quarter" idx="11"/>
-          </p:nvPr>
-        </p:nvSpPr>
-        <p:spPr/>
-        <p:txBody>
-          <a:bodyPr/>
-          <a:lstStyle/>
-          <a:p>
-            <a:r>
-              <a:rPr lang="en-US" smtClean="0"/>
-              <a:t>Copyright © EV3Lessons.com 2015 (Last edit: 2/26/2015)</a:t>
-            </a:r>
-            <a:endParaRPr lang="en-US"/>
-          </a:p>
-        </p:txBody>
-      </p:sp>
-      <p:sp>
-        <p:nvSpPr>
-          <p:cNvPr id="6" name="Slide Number Placeholder 6"/>
-          <p:cNvSpPr>
-            <a:spLocks noGrp="1"/>
-          </p:cNvSpPr>
-          <p:nvPr>
-            <p:ph type="sldNum" sz="quarter" idx="12"/>
-          </p:nvPr>
-        </p:nvSpPr>
-        <p:spPr>
-          <a:xfrm>
-            <a:off x="8477026" y="6358106"/>
-            <a:ext cx="666974" cy="365125"/>
+        <p:spPr>
+          <a:xfrm>
+            <a:off x="457200" y="6172201"/>
+            <a:ext cx="3429000" cy="304800"/>
           </a:xfrm>
           <a:prstGeom prst="rect">
             <a:avLst/>
@@ -5337,7 +5333,61 @@
           <a:bodyPr/>
           <a:lstStyle/>
           <a:p>
-            <a:fld id="{4DBC7FC8-25FB-FC45-8177-2B991DA6778C}" type="slidenum">
+            <a:fld id="{BA4F1EB8-6A3A-8441-853D-A8A1602BFBC8}" type="datetime1">
+              <a:rPr lang="en-US" smtClean="0"/>
+              <a:t>7/3/16</a:t>
+            </a:fld>
+            <a:endParaRPr lang="en-US"/>
+          </a:p>
+        </p:txBody>
+      </p:sp>
+      <p:sp>
+        <p:nvSpPr>
+          <p:cNvPr id="4" name="Footer Placeholder 3"/>
+          <p:cNvSpPr>
+            <a:spLocks noGrp="1"/>
+          </p:cNvSpPr>
+          <p:nvPr>
+            <p:ph type="ftr" sz="quarter" idx="11"/>
+          </p:nvPr>
+        </p:nvSpPr>
+        <p:spPr/>
+        <p:txBody>
+          <a:bodyPr/>
+          <a:lstStyle/>
+          <a:p>
+            <a:r>
+              <a:rPr lang="en-US" smtClean="0"/>
+              <a:t>Copyright © EV3Lessons.com 2016 (Last edit: 07/04/2016)</a:t>
+            </a:r>
+            <a:endParaRPr lang="en-US"/>
+          </a:p>
+        </p:txBody>
+      </p:sp>
+      <p:sp>
+        <p:nvSpPr>
+          <p:cNvPr id="6" name="Slide Number Placeholder 6"/>
+          <p:cNvSpPr>
+            <a:spLocks noGrp="1"/>
+          </p:cNvSpPr>
+          <p:nvPr>
+            <p:ph type="sldNum" sz="quarter" idx="12"/>
+          </p:nvPr>
+        </p:nvSpPr>
+        <p:spPr>
+          <a:xfrm>
+            <a:off x="8477026" y="6358108"/>
+            <a:ext cx="666974" cy="365125"/>
+          </a:xfrm>
+          <a:prstGeom prst="rect">
+            <a:avLst/>
+          </a:prstGeom>
+        </p:spPr>
+        <p:txBody>
+          <a:bodyPr/>
+          <a:lstStyle/>
+          <a:p>
+            <a:fld id="{BBD74847-7BE4-4E4D-8159-51DF7B93C616}" type="slidenum">
               <a:rPr lang="en-US" smtClean="0"/>
               <a:t>‹#›</a:t>
             </a:fld>
@@ -5346,6 +5396,11 @@
         </p:txBody>
       </p:sp>
     </p:spTree>
+    <p:extLst>
+      <p:ext uri="{BB962C8B-B14F-4D97-AF65-F5344CB8AC3E}">
+        <p14:creationId xmlns:p14="http://schemas.microsoft.com/office/powerpoint/2010/main" val="1783418313"/>
+      </p:ext>
+    </p:extLst>
   </p:cSld>
   <p:clrMapOvr>
     <a:masterClrMapping/>
@@ -5387,56 +5442,10 @@
             <p:ph type="dt" sz="half" idx="10"/>
           </p:nvPr>
         </p:nvSpPr>
-        <p:spPr/>
-        <p:txBody>
-          <a:bodyPr/>
-          <a:lstStyle/>
-          <a:p>
-            <a:fld id="{B7F5DAF1-C883-426E-9BD0-729F56E7A62E}" type="datetime1">
-              <a:rPr lang="en-US" smtClean="0"/>
-              <a:t>11/14/15</a:t>
-            </a:fld>
-            <a:endParaRPr lang="en-US"/>
-          </a:p>
-        </p:txBody>
-      </p:sp>
-      <p:sp>
-        <p:nvSpPr>
-          <p:cNvPr id="3" name="Footer Placeholder 2"/>
-          <p:cNvSpPr>
-            <a:spLocks noGrp="1"/>
-          </p:cNvSpPr>
-          <p:nvPr>
-            <p:ph type="ftr" sz="quarter" idx="11"/>
-          </p:nvPr>
-        </p:nvSpPr>
-        <p:spPr/>
-        <p:txBody>
-          <a:bodyPr/>
-          <a:lstStyle/>
-          <a:p>
-            <a:r>
-              <a:rPr lang="en-US" smtClean="0"/>
-              <a:t>Copyright © EV3Lessons.com 2015 (Last edit: 2/26/2015)</a:t>
-            </a:r>
-            <a:endParaRPr lang="en-US"/>
-          </a:p>
-        </p:txBody>
-      </p:sp>
-      <p:sp>
-        <p:nvSpPr>
-          <p:cNvPr id="4" name="Slide Number Placeholder 3"/>
-          <p:cNvSpPr>
-            <a:spLocks noGrp="1"/>
-          </p:cNvSpPr>
-          <p:nvPr>
-            <p:ph type="sldNum" sz="quarter" idx="12"/>
-          </p:nvPr>
-        </p:nvSpPr>
-        <p:spPr>
-          <a:xfrm rot="16200000">
-            <a:off x="8227377" y="5885497"/>
-            <a:ext cx="1315721" cy="365125"/>
+        <p:spPr>
+          <a:xfrm>
+            <a:off x="457200" y="6172201"/>
+            <a:ext cx="3429000" cy="304800"/>
           </a:xfrm>
           <a:prstGeom prst="rect">
             <a:avLst/>
@@ -5446,7 +5455,61 @@
           <a:bodyPr/>
           <a:lstStyle/>
           <a:p>
-            <a:fld id="{4DBC7FC8-25FB-FC45-8177-2B991DA6778C}" type="slidenum">
+            <a:fld id="{A4E9EF99-0867-FA42-8E36-E5F32E4FB5B7}" type="datetime1">
+              <a:rPr lang="en-US" smtClean="0"/>
+              <a:t>7/3/16</a:t>
+            </a:fld>
+            <a:endParaRPr lang="en-US"/>
+          </a:p>
+        </p:txBody>
+      </p:sp>
+      <p:sp>
+        <p:nvSpPr>
+          <p:cNvPr id="3" name="Footer Placeholder 2"/>
+          <p:cNvSpPr>
+            <a:spLocks noGrp="1"/>
+          </p:cNvSpPr>
+          <p:nvPr>
+            <p:ph type="ftr" sz="quarter" idx="11"/>
+          </p:nvPr>
+        </p:nvSpPr>
+        <p:spPr/>
+        <p:txBody>
+          <a:bodyPr/>
+          <a:lstStyle/>
+          <a:p>
+            <a:r>
+              <a:rPr lang="en-US" smtClean="0"/>
+              <a:t>Copyright © EV3Lessons.com 2016 (Last edit: 07/04/2016)</a:t>
+            </a:r>
+            <a:endParaRPr lang="en-US"/>
+          </a:p>
+        </p:txBody>
+      </p:sp>
+      <p:sp>
+        <p:nvSpPr>
+          <p:cNvPr id="4" name="Slide Number Placeholder 3"/>
+          <p:cNvSpPr>
+            <a:spLocks noGrp="1"/>
+          </p:cNvSpPr>
+          <p:nvPr>
+            <p:ph type="sldNum" sz="quarter" idx="12"/>
+          </p:nvPr>
+        </p:nvSpPr>
+        <p:spPr>
+          <a:xfrm rot="16200000">
+            <a:off x="8227378" y="5885499"/>
+            <a:ext cx="1315721" cy="365125"/>
+          </a:xfrm>
+          <a:prstGeom prst="rect">
+            <a:avLst/>
+          </a:prstGeom>
+        </p:spPr>
+        <p:txBody>
+          <a:bodyPr/>
+          <a:lstStyle/>
+          <a:p>
+            <a:fld id="{BBD74847-7BE4-4E4D-8159-51DF7B93C616}" type="slidenum">
               <a:rPr lang="en-US" smtClean="0"/>
               <a:t>‹#›</a:t>
             </a:fld>
@@ -5455,6 +5518,11 @@
         </p:txBody>
       </p:sp>
     </p:spTree>
+    <p:extLst>
+      <p:ext uri="{BB962C8B-B14F-4D97-AF65-F5344CB8AC3E}">
+        <p14:creationId xmlns:p14="http://schemas.microsoft.com/office/powerpoint/2010/main" val="1482325412"/>
+      </p:ext>
+    </p:extLst>
   </p:cSld>
   <p:clrMapOvr>
     <a:masterClrMapping/>
@@ -5576,7 +5644,7 @@
         </p:nvSpPr>
         <p:spPr>
           <a:xfrm>
-            <a:off x="457200" y="1600200"/>
+            <a:off x="457201" y="1600200"/>
             <a:ext cx="3008313" cy="4480560"/>
           </a:xfrm>
         </p:spPr>
@@ -5641,56 +5709,10 @@
             <p:ph type="dt" sz="half" idx="10"/>
           </p:nvPr>
         </p:nvSpPr>
-        <p:spPr/>
-        <p:txBody>
-          <a:bodyPr/>
-          <a:lstStyle/>
-          <a:p>
-            <a:fld id="{2600421B-2FF4-4681-B8FD-017EFCF479E2}" type="datetime1">
-              <a:rPr lang="en-US" smtClean="0"/>
-              <a:t>11/14/15</a:t>
-            </a:fld>
-            <a:endParaRPr lang="en-US"/>
-          </a:p>
-        </p:txBody>
-      </p:sp>
-      <p:sp>
-        <p:nvSpPr>
-          <p:cNvPr id="6" name="Footer Placeholder 5"/>
-          <p:cNvSpPr>
-            <a:spLocks noGrp="1"/>
-          </p:cNvSpPr>
-          <p:nvPr>
-            <p:ph type="ftr" sz="quarter" idx="11"/>
-          </p:nvPr>
-        </p:nvSpPr>
-        <p:spPr/>
-        <p:txBody>
-          <a:bodyPr/>
-          <a:lstStyle/>
-          <a:p>
-            <a:r>
-              <a:rPr lang="en-US" smtClean="0"/>
-              <a:t>Copyright © EV3Lessons.com 2015 (Last edit: 2/26/2015)</a:t>
-            </a:r>
-            <a:endParaRPr lang="en-US"/>
-          </a:p>
-        </p:txBody>
-      </p:sp>
-      <p:sp>
-        <p:nvSpPr>
-          <p:cNvPr id="7" name="Slide Number Placeholder 6"/>
-          <p:cNvSpPr>
-            <a:spLocks noGrp="1"/>
-          </p:cNvSpPr>
-          <p:nvPr>
-            <p:ph type="sldNum" sz="quarter" idx="12"/>
-          </p:nvPr>
-        </p:nvSpPr>
-        <p:spPr>
-          <a:xfrm rot="16200000">
-            <a:off x="8227377" y="5885497"/>
-            <a:ext cx="1315721" cy="365125"/>
+        <p:spPr>
+          <a:xfrm>
+            <a:off x="457200" y="6172201"/>
+            <a:ext cx="3429000" cy="304800"/>
           </a:xfrm>
           <a:prstGeom prst="rect">
             <a:avLst/>
@@ -5700,7 +5722,61 @@
           <a:bodyPr/>
           <a:lstStyle/>
           <a:p>
-            <a:fld id="{4DBC7FC8-25FB-FC45-8177-2B991DA6778C}" type="slidenum">
+            <a:fld id="{87517FE2-9CAE-094F-8434-97D4B031A73F}" type="datetime1">
+              <a:rPr lang="en-US" smtClean="0"/>
+              <a:t>7/3/16</a:t>
+            </a:fld>
+            <a:endParaRPr lang="en-US"/>
+          </a:p>
+        </p:txBody>
+      </p:sp>
+      <p:sp>
+        <p:nvSpPr>
+          <p:cNvPr id="6" name="Footer Placeholder 5"/>
+          <p:cNvSpPr>
+            <a:spLocks noGrp="1"/>
+          </p:cNvSpPr>
+          <p:nvPr>
+            <p:ph type="ftr" sz="quarter" idx="11"/>
+          </p:nvPr>
+        </p:nvSpPr>
+        <p:spPr/>
+        <p:txBody>
+          <a:bodyPr/>
+          <a:lstStyle/>
+          <a:p>
+            <a:r>
+              <a:rPr lang="en-US" smtClean="0"/>
+              <a:t>Copyright © EV3Lessons.com 2016 (Last edit: 07/04/2016)</a:t>
+            </a:r>
+            <a:endParaRPr lang="en-US"/>
+          </a:p>
+        </p:txBody>
+      </p:sp>
+      <p:sp>
+        <p:nvSpPr>
+          <p:cNvPr id="7" name="Slide Number Placeholder 6"/>
+          <p:cNvSpPr>
+            <a:spLocks noGrp="1"/>
+          </p:cNvSpPr>
+          <p:nvPr>
+            <p:ph type="sldNum" sz="quarter" idx="12"/>
+          </p:nvPr>
+        </p:nvSpPr>
+        <p:spPr>
+          <a:xfrm rot="16200000">
+            <a:off x="8227378" y="5885499"/>
+            <a:ext cx="1315721" cy="365125"/>
+          </a:xfrm>
+          <a:prstGeom prst="rect">
+            <a:avLst/>
+          </a:prstGeom>
+        </p:spPr>
+        <p:txBody>
+          <a:bodyPr/>
+          <a:lstStyle/>
+          <a:p>
+            <a:fld id="{BBD74847-7BE4-4E4D-8159-51DF7B93C616}" type="slidenum">
               <a:rPr lang="en-US" smtClean="0"/>
               <a:t>‹#›</a:t>
             </a:fld>
@@ -5732,6 +5808,11 @@
         </p:txBody>
       </p:sp>
     </p:spTree>
+    <p:extLst>
+      <p:ext uri="{BB962C8B-B14F-4D97-AF65-F5344CB8AC3E}">
+        <p14:creationId xmlns:p14="http://schemas.microsoft.com/office/powerpoint/2010/main" val="485410637"/>
+      </p:ext>
+    </p:extLst>
   </p:cSld>
   <p:clrMapOvr>
     <a:masterClrMapping/>
@@ -5764,7 +5845,7 @@
         </p:nvSpPr>
         <p:spPr>
           <a:xfrm>
-            <a:off x="9001124" y="4846320"/>
+            <a:off x="9001125" y="4846320"/>
             <a:ext cx="142876" cy="2011680"/>
           </a:xfrm>
           <a:prstGeom prst="rect">
@@ -5798,7 +5879,7 @@
           <a:lstStyle/>
           <a:p>
             <a:pPr algn="ctr"/>
-            <a:endParaRPr lang="en-US"/>
+            <a:endParaRPr lang="en-US" sz="1800"/>
           </a:p>
         </p:txBody>
       </p:sp>
@@ -5947,14 +6028,22 @@
             <p:ph type="dt" sz="half" idx="10"/>
           </p:nvPr>
         </p:nvSpPr>
-        <p:spPr/>
-        <p:txBody>
-          <a:bodyPr/>
-          <a:lstStyle/>
-          <a:p>
-            <a:fld id="{A2AE46EC-01D0-4B23-8616-BD85B7D82CBA}" type="datetime1">
-              <a:rPr lang="en-US" smtClean="0"/>
-              <a:t>11/14/15</a:t>
+        <p:spPr>
+          <a:xfrm>
+            <a:off x="457200" y="6172201"/>
+            <a:ext cx="3429000" cy="304800"/>
+          </a:xfrm>
+          <a:prstGeom prst="rect">
+            <a:avLst/>
+          </a:prstGeom>
+        </p:spPr>
+        <p:txBody>
+          <a:bodyPr/>
+          <a:lstStyle/>
+          <a:p>
+            <a:fld id="{67CBA54D-EB26-7F45-A39D-399891202CF5}" type="datetime1">
+              <a:rPr lang="en-US" smtClean="0"/>
+              <a:t>7/3/16</a:t>
             </a:fld>
             <a:endParaRPr lang="en-US"/>
           </a:p>
@@ -5977,7 +6066,7 @@
           <a:p>
             <a:r>
               <a:rPr lang="en-US" smtClean="0"/>
-              <a:t>Copyright © EV3Lessons.com 2015 (Last edit: 2/26/2015)</a:t>
+              <a:t>Copyright © EV3Lessons.com 2016 (Last edit: 07/04/2016)</a:t>
             </a:r>
             <a:endParaRPr lang="en-US"/>
           </a:p>
@@ -5995,7 +6084,7 @@
         </p:nvSpPr>
         <p:spPr>
           <a:xfrm rot="16200000">
-            <a:off x="8227377" y="5885497"/>
+            <a:off x="8227378" y="5885499"/>
             <a:ext cx="1315721" cy="365125"/>
           </a:xfrm>
           <a:prstGeom prst="rect">
@@ -6014,7 +6103,7 @@
             </a:lvl1pPr>
           </a:lstStyle>
           <a:p>
-            <a:fld id="{4DBC7FC8-25FB-FC45-8177-2B991DA6778C}" type="slidenum">
+            <a:fld id="{BBD74847-7BE4-4E4D-8159-51DF7B93C616}" type="slidenum">
               <a:rPr lang="en-US" smtClean="0"/>
               <a:t>‹#›</a:t>
             </a:fld>
@@ -6064,7 +6153,7 @@
         </p:nvSpPr>
         <p:spPr>
           <a:xfrm>
-            <a:off x="9001124" y="0"/>
+            <a:off x="9001125" y="0"/>
             <a:ext cx="142876" cy="4846320"/>
           </a:xfrm>
           <a:prstGeom prst="rect">
@@ -6098,11 +6187,16 @@
           <a:lstStyle/>
           <a:p>
             <a:pPr algn="ctr"/>
-            <a:endParaRPr lang="en-US"/>
+            <a:endParaRPr lang="en-US" sz="1800"/>
           </a:p>
         </p:txBody>
       </p:sp>
     </p:spTree>
+    <p:extLst>
+      <p:ext uri="{BB962C8B-B14F-4D97-AF65-F5344CB8AC3E}">
+        <p14:creationId xmlns:p14="http://schemas.microsoft.com/office/powerpoint/2010/main" val="6201106"/>
+      </p:ext>
+    </p:extLst>
   </p:cSld>
   <p:clrMapOvr>
     <a:masterClrMapping/>
@@ -6111,7 +6205,7 @@
 </file>
 
 <file path=ppt/slideMasters/slideMaster1.xml><?xml version="1.0" encoding="utf-8"?>
-<p:sldMaster xmlns:a="http://schemas.openxmlformats.org/drawingml/2006/main" xmlns:r="http://schemas.openxmlformats.org/officeDocument/2006/relationships" xmlns:p="http://schemas.openxmlformats.org/presentationml/2006/main">
+<p:sldMaster xmlns:a="http://schemas.openxmlformats.org/drawingml/2006/main" xmlns:r="http://schemas.openxmlformats.org/officeDocument/2006/relationships" xmlns:p="http://schemas.openxmlformats.org/presentationml/2006/main" preserve="1">
   <p:cSld>
     <p:bg>
       <p:bgRef idx="1001">
@@ -6144,7 +6238,7 @@
         </p:nvSpPr>
         <p:spPr>
           <a:xfrm>
-            <a:off x="457199" y="152718"/>
+            <a:off x="457200" y="152718"/>
             <a:ext cx="8245475" cy="1371600"/>
           </a:xfrm>
           <a:prstGeom prst="rect">
@@ -6158,7 +6252,7 @@
           <a:lstStyle/>
           <a:p>
             <a:r>
-              <a:rPr lang="en-US" dirty="0" smtClean="0"/>
+              <a:rPr lang="en-US" smtClean="0"/>
               <a:t>Click to edit Master title style</a:t>
             </a:r>
             <a:endParaRPr lang="en-US" dirty="0"/>
@@ -6177,7 +6271,7 @@
         </p:nvSpPr>
         <p:spPr>
           <a:xfrm>
-            <a:off x="457200" y="1752600"/>
+            <a:off x="457200" y="1752602"/>
             <a:ext cx="8245474" cy="4373563"/>
           </a:xfrm>
           <a:prstGeom prst="rect">
@@ -6229,45 +6323,6 @@
       </p:sp>
       <p:sp>
         <p:nvSpPr>
-          <p:cNvPr id="4" name="Date Placeholder 3"/>
-          <p:cNvSpPr>
-            <a:spLocks noGrp="1"/>
-          </p:cNvSpPr>
-          <p:nvPr>
-            <p:ph type="dt" sz="half" idx="2"/>
-          </p:nvPr>
-        </p:nvSpPr>
-        <p:spPr>
-          <a:xfrm>
-            <a:off x="457200" y="6172201"/>
-            <a:ext cx="3429000" cy="304800"/>
-          </a:xfrm>
-          <a:prstGeom prst="rect">
-            <a:avLst/>
-          </a:prstGeom>
-        </p:spPr>
-        <p:txBody>
-          <a:bodyPr vert="horz" lIns="91440" tIns="45720" rIns="91440" bIns="0" rtlCol="0" anchor="b"/>
-          <a:lstStyle>
-            <a:lvl1pPr algn="l">
-              <a:defRPr sz="1000">
-                <a:solidFill>
-                  <a:schemeClr val="tx1"/>
-                </a:solidFill>
-              </a:defRPr>
-            </a:lvl1pPr>
-          </a:lstStyle>
-          <a:p>
-            <a:fld id="{29A57015-001D-4DE7-896F-4E51C0D3D8D0}" type="datetime1">
-              <a:rPr lang="en-US" smtClean="0"/>
-              <a:t>11/14/15</a:t>
-            </a:fld>
-            <a:endParaRPr lang="en-US"/>
-          </a:p>
-        </p:txBody>
-      </p:sp>
-      <p:sp>
-        <p:nvSpPr>
           <p:cNvPr id="5" name="Footer Placeholder 4"/>
           <p:cNvSpPr>
             <a:spLocks noGrp="1"/>
@@ -6278,8 +6333,8 @@
         </p:nvSpPr>
         <p:spPr>
           <a:xfrm>
-            <a:off x="457200" y="6492875"/>
-            <a:ext cx="3429000" cy="283845"/>
+            <a:off x="457200" y="6492877"/>
+            <a:ext cx="3699164" cy="283845"/>
           </a:xfrm>
           <a:prstGeom prst="rect">
             <a:avLst/>
@@ -6299,9 +6354,9 @@
           <a:p>
             <a:r>
               <a:rPr lang="en-US" smtClean="0"/>
-              <a:t>Copyright © EV3Lessons.com 2015 (Last edit: 2/26/2015)</a:t>
-            </a:r>
-            <a:endParaRPr lang="en-US" dirty="0"/>
+              <a:t>Copyright © EV3Lessons.com 2016 (Last edit: 07/04/2016)</a:t>
+            </a:r>
+            <a:endParaRPr lang="en-US"/>
           </a:p>
         </p:txBody>
       </p:sp>
@@ -6317,7 +6372,7 @@
         </p:nvSpPr>
         <p:spPr>
           <a:xfrm>
-            <a:off x="8477026" y="6358106"/>
+            <a:off x="8477026" y="6358108"/>
             <a:ext cx="666974" cy="365125"/>
           </a:xfrm>
           <a:prstGeom prst="rect">
@@ -6328,7 +6383,7 @@
           <a:bodyPr/>
           <a:lstStyle/>
           <a:p>
-            <a:fld id="{4DBC7FC8-25FB-FC45-8177-2B991DA6778C}" type="slidenum">
+            <a:fld id="{BBD74847-7BE4-4E4D-8159-51DF7B93C616}" type="slidenum">
               <a:rPr lang="en-US" smtClean="0"/>
               <a:t>‹#›</a:t>
             </a:fld>
@@ -6340,11 +6395,11 @@
         <p:nvSpPr>
           <p:cNvPr id="10" name="Rectangle 9"/>
           <p:cNvSpPr/>
-          <p:nvPr userDrawn="1"/>
-        </p:nvSpPr>
-        <p:spPr>
-          <a:xfrm>
-            <a:off x="8996106" y="2895600"/>
+          <p:nvPr/>
+        </p:nvSpPr>
+        <p:spPr>
+          <a:xfrm>
+            <a:off x="8996107" y="2895600"/>
             <a:ext cx="147895" cy="3962400"/>
           </a:xfrm>
           <a:prstGeom prst="rect">
@@ -6378,7 +6433,7 @@
         <p:nvSpPr>
           <p:cNvPr id="11" name="Rectangle 10"/>
           <p:cNvSpPr/>
-          <p:nvPr userDrawn="1"/>
+          <p:nvPr/>
         </p:nvSpPr>
         <p:spPr>
           <a:xfrm>
@@ -6416,7 +6471,7 @@
         <p:nvSpPr>
           <p:cNvPr id="12" name="Rectangle 11"/>
           <p:cNvSpPr/>
-          <p:nvPr userDrawn="1"/>
+          <p:nvPr/>
         </p:nvSpPr>
         <p:spPr>
           <a:xfrm>
@@ -6451,20 +6506,25 @@
         </p:style>
       </p:sp>
     </p:spTree>
+    <p:extLst>
+      <p:ext uri="{BB962C8B-B14F-4D97-AF65-F5344CB8AC3E}">
+        <p14:creationId xmlns:p14="http://schemas.microsoft.com/office/powerpoint/2010/main" val="1613274436"/>
+      </p:ext>
+    </p:extLst>
   </p:cSld>
   <p:clrMap bg1="lt1" tx1="dk1" bg2="lt2" tx2="dk2" accent1="accent1" accent2="accent2" accent3="accent3" accent4="accent4" accent5="accent5" accent6="accent6" hlink="hlink" folHlink="folHlink"/>
   <p:sldLayoutIdLst>
-    <p:sldLayoutId id="2147483715" r:id="rId1"/>
-    <p:sldLayoutId id="2147483716" r:id="rId2"/>
-    <p:sldLayoutId id="2147483717" r:id="rId3"/>
-    <p:sldLayoutId id="2147483718" r:id="rId4"/>
-    <p:sldLayoutId id="2147483719" r:id="rId5"/>
-    <p:sldLayoutId id="2147483720" r:id="rId6"/>
-    <p:sldLayoutId id="2147483721" r:id="rId7"/>
-    <p:sldLayoutId id="2147483722" r:id="rId8"/>
-    <p:sldLayoutId id="2147483723" r:id="rId9"/>
-    <p:sldLayoutId id="2147483724" r:id="rId10"/>
-    <p:sldLayoutId id="2147483725" r:id="rId11"/>
+    <p:sldLayoutId id="2147483661" r:id="rId1"/>
+    <p:sldLayoutId id="2147483662" r:id="rId2"/>
+    <p:sldLayoutId id="2147483663" r:id="rId3"/>
+    <p:sldLayoutId id="2147483664" r:id="rId4"/>
+    <p:sldLayoutId id="2147483665" r:id="rId5"/>
+    <p:sldLayoutId id="2147483666" r:id="rId6"/>
+    <p:sldLayoutId id="2147483667" r:id="rId7"/>
+    <p:sldLayoutId id="2147483668" r:id="rId8"/>
+    <p:sldLayoutId id="2147483669" r:id="rId9"/>
+    <p:sldLayoutId id="2147483670" r:id="rId10"/>
+    <p:sldLayoutId id="2147483671" r:id="rId11"/>
   </p:sldLayoutIdLst>
   <p:timing>
     <p:tnLst>
@@ -6788,7 +6848,7 @@
         </p:nvSpPr>
         <p:spPr>
           <a:xfrm>
-            <a:off x="628650" y="365125"/>
+            <a:off x="628650" y="365127"/>
             <a:ext cx="7886700" cy="1325563"/>
           </a:xfrm>
           <a:prstGeom prst="rect">
@@ -6883,7 +6943,7 @@
         </p:nvSpPr>
         <p:spPr>
           <a:xfrm>
-            <a:off x="628650" y="6356350"/>
+            <a:off x="628650" y="6356352"/>
             <a:ext cx="2057400" cy="365125"/>
           </a:xfrm>
           <a:prstGeom prst="rect">
@@ -6904,9 +6964,9 @@
             </a:lvl1pPr>
           </a:lstStyle>
           <a:p>
-            <a:fld id="{D889A880-9C41-474C-89CB-FEF116EF758F}" type="datetime1">
-              <a:rPr lang="en-US" smtClean="0"/>
-              <a:t>11/14/15</a:t>
+            <a:fld id="{0F394D44-1C4A-CE4E-8D66-831A93CF23A8}" type="datetime1">
+              <a:rPr lang="en-US" smtClean="0"/>
+              <a:t>7/3/16</a:t>
             </a:fld>
             <a:endParaRPr lang="en-US"/>
           </a:p>
@@ -6924,7 +6984,7 @@
         </p:nvSpPr>
         <p:spPr>
           <a:xfrm>
-            <a:off x="3028950" y="6356350"/>
+            <a:off x="3028950" y="6356352"/>
             <a:ext cx="3086100" cy="365125"/>
           </a:xfrm>
           <a:prstGeom prst="rect">
@@ -6947,7 +7007,7 @@
           <a:p>
             <a:r>
               <a:rPr lang="en-US" smtClean="0"/>
-              <a:t>Copyright © EV3Lessons.com 2015 (Last edit: 2/26/2015)</a:t>
+              <a:t>Copyright © EV3Lessons.com 2016 (Last edit: 07/04/2016)</a:t>
             </a:r>
             <a:endParaRPr lang="en-US"/>
           </a:p>
@@ -6965,7 +7025,7 @@
         </p:nvSpPr>
         <p:spPr>
           <a:xfrm>
-            <a:off x="6457950" y="6356350"/>
+            <a:off x="6457950" y="6356352"/>
             <a:ext cx="2057400" cy="365125"/>
           </a:xfrm>
           <a:prstGeom prst="rect">
@@ -6997,23 +7057,23 @@
     </p:spTree>
     <p:extLst>
       <p:ext uri="{BB962C8B-B14F-4D97-AF65-F5344CB8AC3E}">
-        <p14:creationId xmlns:p14="http://schemas.microsoft.com/office/powerpoint/2010/main" val="3556437462"/>
+        <p14:creationId xmlns:p14="http://schemas.microsoft.com/office/powerpoint/2010/main" val="415687264"/>
       </p:ext>
     </p:extLst>
   </p:cSld>
   <p:clrMap bg1="lt1" tx1="dk1" bg2="lt2" tx2="dk2" accent1="accent1" accent2="accent2" accent3="accent3" accent4="accent4" accent5="accent5" accent6="accent6" hlink="hlink" folHlink="folHlink"/>
   <p:sldLayoutIdLst>
-    <p:sldLayoutId id="2147483727" r:id="rId1"/>
-    <p:sldLayoutId id="2147483728" r:id="rId2"/>
-    <p:sldLayoutId id="2147483729" r:id="rId3"/>
-    <p:sldLayoutId id="2147483730" r:id="rId4"/>
-    <p:sldLayoutId id="2147483731" r:id="rId5"/>
-    <p:sldLayoutId id="2147483732" r:id="rId6"/>
-    <p:sldLayoutId id="2147483733" r:id="rId7"/>
-    <p:sldLayoutId id="2147483734" r:id="rId8"/>
-    <p:sldLayoutId id="2147483735" r:id="rId9"/>
-    <p:sldLayoutId id="2147483736" r:id="rId10"/>
-    <p:sldLayoutId id="2147483737" r:id="rId11"/>
+    <p:sldLayoutId id="2147483673" r:id="rId1"/>
+    <p:sldLayoutId id="2147483674" r:id="rId2"/>
+    <p:sldLayoutId id="2147483675" r:id="rId3"/>
+    <p:sldLayoutId id="2147483676" r:id="rId4"/>
+    <p:sldLayoutId id="2147483677" r:id="rId5"/>
+    <p:sldLayoutId id="2147483678" r:id="rId6"/>
+    <p:sldLayoutId id="2147483679" r:id="rId7"/>
+    <p:sldLayoutId id="2147483680" r:id="rId8"/>
+    <p:sldLayoutId id="2147483681" r:id="rId9"/>
+    <p:sldLayoutId id="2147483682" r:id="rId10"/>
+    <p:sldLayoutId id="2147483683" r:id="rId11"/>
   </p:sldLayoutIdLst>
   <p:hf hdr="0" dt="0"/>
   <p:txStyles>
@@ -7318,7 +7378,30 @@
       </p:grpSpPr>
       <p:sp>
         <p:nvSpPr>
-          <p:cNvPr id="2" name="Title 1"/>
+          <p:cNvPr id="2" name="Subtitle 1"/>
+          <p:cNvSpPr>
+            <a:spLocks noGrp="1"/>
+          </p:cNvSpPr>
+          <p:nvPr>
+            <p:ph type="subTitle" idx="1"/>
+          </p:nvPr>
+        </p:nvSpPr>
+        <p:spPr/>
+        <p:txBody>
+          <a:bodyPr/>
+          <a:lstStyle/>
+          <a:p>
+            <a:r>
+              <a:rPr lang="en-US" dirty="0" smtClean="0"/>
+              <a:t>Introduction to the EV3 Brick and Software</a:t>
+            </a:r>
+            <a:endParaRPr lang="en-US" dirty="0"/>
+          </a:p>
+        </p:txBody>
+      </p:sp>
+      <p:sp>
+        <p:nvSpPr>
+          <p:cNvPr id="3" name="Title 2"/>
           <p:cNvSpPr>
             <a:spLocks noGrp="1"/>
           </p:cNvSpPr>
@@ -7326,206 +7409,30 @@
             <p:ph type="ctrTitle"/>
           </p:nvPr>
         </p:nvSpPr>
-        <p:spPr>
-          <a:xfrm>
-            <a:off x="402305" y="311631"/>
-            <a:ext cx="4182799" cy="1923569"/>
-          </a:xfrm>
-        </p:spPr>
+        <p:spPr/>
         <p:txBody>
           <a:bodyPr/>
           <a:lstStyle/>
           <a:p>
             <a:pPr algn="ctr"/>
             <a:r>
-              <a:rPr lang="en-US" sz="3200" dirty="0" smtClean="0"/>
-              <a:t>BEGINNER EV3 PROGRAMMING</a:t>
-            </a:r>
-            <a:r>
-              <a:rPr lang="en-US" sz="4000" dirty="0" smtClean="0"/>
-              <a:t/>
-            </a:r>
-            <a:br>
-              <a:rPr lang="en-US" sz="4000" dirty="0" smtClean="0"/>
-            </a:br>
-            <a:r>
-              <a:rPr lang="en-US" sz="3200" dirty="0" smtClean="0"/>
-              <a:t>Lesson</a:t>
-            </a:r>
-            <a:endParaRPr lang="en-US" sz="3200" dirty="0"/>
-          </a:p>
-        </p:txBody>
-      </p:sp>
-      <p:sp>
-        <p:nvSpPr>
-          <p:cNvPr id="7" name="TextBox 6"/>
-          <p:cNvSpPr txBox="1"/>
-          <p:nvPr/>
-        </p:nvSpPr>
-        <p:spPr>
-          <a:xfrm>
-            <a:off x="1487501" y="5949643"/>
-            <a:ext cx="4750545" cy="523220"/>
-          </a:xfrm>
-          <a:prstGeom prst="rect">
-            <a:avLst/>
-          </a:prstGeom>
-          <a:noFill/>
-        </p:spPr>
-        <p:txBody>
-          <a:bodyPr wrap="square" rtlCol="0">
-            <a:spAutoFit/>
-          </a:bodyPr>
-          <a:lstStyle/>
-          <a:p>
-            <a:r>
-              <a:rPr lang="en-US" sz="2800" dirty="0" smtClean="0"/>
-              <a:t>By: Droids Robotics</a:t>
-            </a:r>
-          </a:p>
-        </p:txBody>
-      </p:sp>
-      <p:sp>
-        <p:nvSpPr>
-          <p:cNvPr id="4" name="TextBox 3"/>
-          <p:cNvSpPr txBox="1"/>
-          <p:nvPr/>
-        </p:nvSpPr>
-        <p:spPr>
-          <a:xfrm>
-            <a:off x="550088" y="2713113"/>
-            <a:ext cx="8187512" cy="1384995"/>
-          </a:xfrm>
-          <a:prstGeom prst="rect">
-            <a:avLst/>
-          </a:prstGeom>
-          <a:noFill/>
-        </p:spPr>
-        <p:txBody>
-          <a:bodyPr wrap="square" rtlCol="0">
-            <a:spAutoFit/>
-          </a:bodyPr>
-          <a:lstStyle/>
-          <a:p>
-            <a:r>
-              <a:rPr lang="en-US" sz="2800" dirty="0" smtClean="0">
-                <a:solidFill>
-                  <a:srgbClr val="FF0000"/>
-                </a:solidFill>
-              </a:rPr>
-              <a:t>Topics Covered:</a:t>
-            </a:r>
-          </a:p>
-          <a:p>
-            <a:r>
-              <a:rPr lang="en-US" sz="2800" dirty="0" smtClean="0">
-                <a:solidFill>
-                  <a:srgbClr val="FF0000"/>
-                </a:solidFill>
-              </a:rPr>
-              <a:t>EV3 Basics</a:t>
-            </a:r>
-          </a:p>
-          <a:p>
-            <a:r>
-              <a:rPr lang="en-US" sz="2800" dirty="0" smtClean="0">
-                <a:solidFill>
-                  <a:srgbClr val="FF0000"/>
-                </a:solidFill>
-              </a:rPr>
-              <a:t>Introduction to the EV3 Brick and Software</a:t>
-            </a:r>
-          </a:p>
-        </p:txBody>
-      </p:sp>
-      <p:pic>
-        <p:nvPicPr>
-          <p:cNvPr id="1026" name="Picture 2" descr="EV3Lessons.com"/>
-          <p:cNvPicPr>
-            <a:picLocks noChangeAspect="1" noChangeArrowheads="1"/>
-          </p:cNvPicPr>
-          <p:nvPr/>
-        </p:nvPicPr>
-        <p:blipFill>
-          <a:blip r:embed="rId3">
-            <a:extLst>
-              <a:ext uri="{28A0092B-C50C-407E-A947-70E740481C1C}">
-                <a14:useLocalDpi xmlns:a14="http://schemas.microsoft.com/office/drawing/2010/main" val="0"/>
-              </a:ext>
-            </a:extLst>
-          </a:blip>
-          <a:srcRect/>
-          <a:stretch>
-            <a:fillRect/>
-          </a:stretch>
-        </p:blipFill>
-        <p:spPr bwMode="auto">
-          <a:xfrm>
-            <a:off x="4585105" y="436041"/>
-            <a:ext cx="4231698" cy="1571774"/>
-          </a:xfrm>
-          <a:prstGeom prst="rect">
-            <a:avLst/>
-          </a:prstGeom>
-          <a:noFill/>
-          <a:extLst>
-            <a:ext uri="{909E8E84-426E-40dd-AFC4-6F175D3DCCD1}">
-              <a14:hiddenFill xmlns:a14="http://schemas.microsoft.com/office/drawing/2010/main" xmlns="">
-                <a:solidFill>
-                  <a:srgbClr val="FFFFFF"/>
-                </a:solidFill>
-              </a14:hiddenFill>
-            </a:ext>
-          </a:extLst>
-        </p:spPr>
-      </p:pic>
-      <p:pic>
-        <p:nvPicPr>
-          <p:cNvPr id="5" name="Picture 4"/>
-          <p:cNvPicPr>
-            <a:picLocks noChangeAspect="1"/>
-          </p:cNvPicPr>
-          <p:nvPr/>
-        </p:nvPicPr>
-        <p:blipFill>
-          <a:blip r:embed="rId4">
-            <a:extLst>
-              <a:ext uri="{28A0092B-C50C-407E-A947-70E740481C1C}">
-                <a14:useLocalDpi xmlns:a14="http://schemas.microsoft.com/office/drawing/2010/main" val="0"/>
-              </a:ext>
-            </a:extLst>
-          </a:blip>
-          <a:stretch>
-            <a:fillRect/>
-          </a:stretch>
-        </p:blipFill>
-        <p:spPr>
-          <a:xfrm>
-            <a:off x="220718" y="5118541"/>
-            <a:ext cx="1327779" cy="1270242"/>
-          </a:xfrm>
-          <a:prstGeom prst="rect">
-            <a:avLst/>
-          </a:prstGeom>
-        </p:spPr>
-      </p:pic>
+              <a:rPr lang="en-US" dirty="0" smtClean="0"/>
+              <a:t>BEGINNER PROGRAMMING LESSON</a:t>
+            </a:r>
+            <a:endParaRPr lang="en-US" dirty="0"/>
+          </a:p>
+        </p:txBody>
+      </p:sp>
     </p:spTree>
     <p:extLst>
       <p:ext uri="{BB962C8B-B14F-4D97-AF65-F5344CB8AC3E}">
-        <p14:creationId xmlns:p14="http://schemas.microsoft.com/office/powerpoint/2010/main" val="3637626458"/>
+        <p14:creationId xmlns:p14="http://schemas.microsoft.com/office/powerpoint/2010/main" val="1759130248"/>
       </p:ext>
     </p:extLst>
   </p:cSld>
   <p:clrMapOvr>
     <a:masterClrMapping/>
   </p:clrMapOvr>
-  <p:timing>
-    <p:tnLst>
-      <p:par>
-        <p:cTn id="1" dur="indefinite" restart="never" nodeType="tmRoot"/>
-      </p:par>
-    </p:tnLst>
-  </p:timing>
 </p:sld>
 </file>
 
@@ -7590,8 +7497,8 @@
           <a:lstStyle/>
           <a:p>
             <a:r>
-              <a:rPr lang="en-US" dirty="0" smtClean="0"/>
-              <a:t>Copyright © EV3Lessons.com 2015 (Last edit: 2/26/2015)</a:t>
+              <a:rPr lang="en-US" smtClean="0"/>
+              <a:t>Copyright © EV3Lessons.com 2016 (Last edit: 07/04/2016)</a:t>
             </a:r>
             <a:endParaRPr lang="en-US" dirty="0"/>
           </a:p>
@@ -8230,7 +8137,7 @@
     </p:spTree>
     <p:extLst>
       <p:ext uri="{BB962C8B-B14F-4D97-AF65-F5344CB8AC3E}">
-        <p14:creationId xmlns:p14="http://schemas.microsoft.com/office/powerpoint/2010/main" val="3390897214"/>
+        <p14:creationId xmlns:p14="http://schemas.microsoft.com/office/powerpoint/2010/main" val="415529287"/>
       </p:ext>
     </p:extLst>
   </p:cSld>
@@ -8302,8 +8209,8 @@
           <a:lstStyle/>
           <a:p>
             <a:r>
-              <a:rPr lang="en-US" dirty="0" smtClean="0"/>
-              <a:t>Copyright © EV3Lessons.com 2015 (Last edit: 2/26/2015)</a:t>
+              <a:rPr lang="en-US" smtClean="0"/>
+              <a:t>Copyright © EV3Lessons.com 2016 (Last edit: 07/04/2016)</a:t>
             </a:r>
             <a:endParaRPr lang="en-US" dirty="0"/>
           </a:p>
@@ -8954,7 +8861,7 @@
     </p:spTree>
     <p:extLst>
       <p:ext uri="{BB962C8B-B14F-4D97-AF65-F5344CB8AC3E}">
-        <p14:creationId xmlns:p14="http://schemas.microsoft.com/office/powerpoint/2010/main" val="1799147308"/>
+        <p14:creationId xmlns:p14="http://schemas.microsoft.com/office/powerpoint/2010/main" val="183906565"/>
       </p:ext>
     </p:extLst>
   </p:cSld>
@@ -8998,12 +8905,7 @@
             <p:ph type="title"/>
           </p:nvPr>
         </p:nvSpPr>
-        <p:spPr>
-          <a:xfrm>
-            <a:off x="356665" y="439032"/>
-            <a:ext cx="8245475" cy="1371600"/>
-          </a:xfrm>
-        </p:spPr>
+        <p:spPr/>
         <p:txBody>
           <a:bodyPr/>
           <a:lstStyle/>
@@ -9028,59 +8930,32 @@
         </p:nvSpPr>
         <p:spPr>
           <a:xfrm>
-            <a:off x="457200" y="1124832"/>
-            <a:ext cx="8245474" cy="4963057"/>
+            <a:off x="457200" y="1317983"/>
+            <a:ext cx="8245474" cy="1145345"/>
           </a:xfrm>
         </p:spPr>
         <p:txBody>
           <a:bodyPr>
-            <a:noAutofit/>
+            <a:normAutofit/>
           </a:bodyPr>
           <a:lstStyle/>
           <a:p>
-            <a:pPr marL="342900" indent="-342900">
-              <a:buFont typeface="Arial"/>
-              <a:buChar char="•"/>
-            </a:pPr>
-            <a:r>
-              <a:rPr lang="en-US" sz="1800" dirty="0" smtClean="0"/>
-              <a:t>This tutorial was created by Sanjay Seshan and Arvind Seshan from Droids Robotics.</a:t>
-            </a:r>
-          </a:p>
-          <a:p>
-            <a:pPr marL="342900" indent="-342900">
-              <a:buFont typeface="Arial"/>
-              <a:buChar char="•"/>
-            </a:pPr>
-            <a:r>
-              <a:rPr lang="en-US" sz="1800" dirty="0" smtClean="0"/>
+            <a:r>
+              <a:rPr lang="en-US" dirty="0" smtClean="0"/>
+              <a:t>Author: Sanjay and Arvind </a:t>
+            </a:r>
+            <a:r>
+              <a:rPr lang="en-US" dirty="0" err="1" smtClean="0"/>
+              <a:t>Seshan</a:t>
+            </a:r>
+            <a:endParaRPr lang="en-US" dirty="0"/>
+          </a:p>
+          <a:p>
+            <a:r>
+              <a:rPr lang="en-US" dirty="0" smtClean="0"/>
               <a:t>More lessons are available at www.ev3lessons.com</a:t>
             </a:r>
           </a:p>
-          <a:p>
-            <a:pPr marL="342900" indent="-342900">
-              <a:buFont typeface="Arial"/>
-              <a:buChar char="•"/>
-            </a:pPr>
-            <a:r>
-              <a:rPr lang="en-US" sz="1800" dirty="0" smtClean="0"/>
-              <a:t>Author’s Email: </a:t>
-            </a:r>
-            <a:r>
-              <a:rPr lang="en-US" sz="1800" dirty="0" smtClean="0">
-                <a:hlinkClick r:id="rId2"/>
-              </a:rPr>
-              <a:t>team@droidsrobotics.org</a:t>
-            </a:r>
-            <a:r>
-              <a:rPr lang="en-US" sz="1800" b="0" dirty="0"/>
-              <a:t/>
-            </a:r>
-            <a:br>
-              <a:rPr lang="en-US" sz="1800" b="0" dirty="0"/>
-            </a:br>
-            <a:endParaRPr lang="en-US" sz="1800" dirty="0" smtClean="0"/>
-          </a:p>
         </p:txBody>
       </p:sp>
       <p:sp>
@@ -9099,16 +8974,16 @@
           <a:lstStyle/>
           <a:p>
             <a:r>
-              <a:rPr lang="en-US" dirty="0" smtClean="0"/>
-              <a:t>Copyright © EV3Lessons.com 2015 (Last edit: 2/26/2015)</a:t>
-            </a:r>
-            <a:endParaRPr lang="en-US" dirty="0"/>
-          </a:p>
-        </p:txBody>
-      </p:sp>
-      <p:sp>
-        <p:nvSpPr>
-          <p:cNvPr id="6" name="Rectangle 1"/>
+              <a:rPr lang="en-US" smtClean="0"/>
+              <a:t>Copyright © EV3Lessons.com 2016 (Last edit: 07/04/2016)</a:t>
+            </a:r>
+            <a:endParaRPr lang="en-US"/>
+          </a:p>
+        </p:txBody>
+      </p:sp>
+      <p:sp>
+        <p:nvSpPr>
+          <p:cNvPr id="5" name="Rectangle 4"/>
           <p:cNvSpPr>
             <a:spLocks noChangeArrowheads="1"/>
           </p:cNvSpPr>
@@ -9362,7 +9237,7 @@
                 </a:solidFill>
                 <a:effectLst/>
                 <a:latin typeface="Helvetica Neue"/>
-                <a:hlinkClick r:id="rId3"/>
+                <a:hlinkClick r:id="rId2"/>
               </a:rPr>
               <a:t>Creative Commons Attribution-</a:t>
             </a:r>
@@ -9376,7 +9251,7 @@
                 </a:solidFill>
                 <a:effectLst/>
                 <a:latin typeface="Helvetica Neue"/>
-                <a:hlinkClick r:id="rId3"/>
+                <a:hlinkClick r:id="rId2"/>
               </a:rPr>
               <a:t>NonCommercial</a:t>
             </a:r>
@@ -9390,7 +9265,7 @@
                 </a:solidFill>
                 <a:effectLst/>
                 <a:latin typeface="Helvetica Neue"/>
-                <a:hlinkClick r:id="rId3"/>
+                <a:hlinkClick r:id="rId2"/>
               </a:rPr>
               <a:t>-</a:t>
             </a:r>
@@ -9404,7 +9279,7 @@
                 </a:solidFill>
                 <a:effectLst/>
                 <a:latin typeface="Helvetica Neue"/>
-                <a:hlinkClick r:id="rId3"/>
+                <a:hlinkClick r:id="rId2"/>
               </a:rPr>
               <a:t>ShareAlike</a:t>
             </a:r>
@@ -9418,7 +9293,7 @@
                 </a:solidFill>
                 <a:effectLst/>
                 <a:latin typeface="Helvetica Neue"/>
-                <a:hlinkClick r:id="rId3"/>
+                <a:hlinkClick r:id="rId2"/>
               </a:rPr>
               <a:t> 4.0 International License</a:t>
             </a:r>
@@ -9462,8 +9337,8 @@
       </p:sp>
       <p:pic>
         <p:nvPicPr>
-          <p:cNvPr id="2050" name="Picture 2" descr="Creative Commons License">
-            <a:hlinkClick r:id="rId3"/>
+          <p:cNvPr id="6" name="Picture 5" descr="Creative Commons License">
+            <a:hlinkClick r:id="rId2"/>
           </p:cNvPr>
           <p:cNvPicPr>
             <a:picLocks noChangeAspect="1" noChangeArrowheads="1"/>
@@ -9471,7 +9346,7 @@
           <p:nvPr/>
         </p:nvPicPr>
         <p:blipFill>
-          <a:blip r:embed="rId4">
+          <a:blip r:embed="rId3">
             <a:extLst>
               <a:ext uri="{28A0092B-C50C-407E-A947-70E740481C1C}">
                 <a14:useLocalDpi xmlns:a14="http://schemas.microsoft.com/office/drawing/2010/main" val="0"/>
@@ -9485,7 +9360,7 @@
         </p:blipFill>
         <p:spPr bwMode="auto">
           <a:xfrm>
-            <a:off x="3618595" y="3609409"/>
+            <a:off x="3499211" y="3247882"/>
             <a:ext cx="2161449" cy="761422"/>
           </a:xfrm>
           <a:prstGeom prst="rect">
@@ -9505,7 +9380,7 @@
       </p:pic>
       <p:sp>
         <p:nvSpPr>
-          <p:cNvPr id="5" name="Slide Number Placeholder 4"/>
+          <p:cNvPr id="7" name="Slide Number Placeholder 6"/>
           <p:cNvSpPr>
             <a:spLocks noGrp="1"/>
           </p:cNvSpPr>
@@ -9518,7 +9393,7 @@
           <a:bodyPr/>
           <a:lstStyle/>
           <a:p>
-            <a:fld id="{4DBC7FC8-25FB-FC45-8177-2B991DA6778C}" type="slidenum">
+            <a:fld id="{BBD74847-7BE4-4E4D-8159-51DF7B93C616}" type="slidenum">
               <a:rPr lang="en-US" smtClean="0"/>
               <a:t>12</a:t>
             </a:fld>
@@ -9529,7 +9404,7 @@
     </p:spTree>
     <p:extLst>
       <p:ext uri="{BB962C8B-B14F-4D97-AF65-F5344CB8AC3E}">
-        <p14:creationId xmlns:p14="http://schemas.microsoft.com/office/powerpoint/2010/main" val="2543612530"/>
+        <p14:creationId xmlns:p14="http://schemas.microsoft.com/office/powerpoint/2010/main" val="1777067036"/>
       </p:ext>
     </p:extLst>
   </p:cSld>
@@ -9653,7 +9528,7 @@
           <a:p>
             <a:r>
               <a:rPr lang="en-US" smtClean="0"/>
-              <a:t>Copyright © EV3Lessons.com 2015 (Last edit: 2/26/2015)</a:t>
+              <a:t>Copyright © EV3Lessons.com 2016 (Last edit: 07/04/2016)</a:t>
             </a:r>
             <a:endParaRPr lang="en-US"/>
           </a:p>
@@ -9685,7 +9560,7 @@
     </p:spTree>
     <p:extLst>
       <p:ext uri="{BB962C8B-B14F-4D97-AF65-F5344CB8AC3E}">
-        <p14:creationId xmlns:p14="http://schemas.microsoft.com/office/powerpoint/2010/main" val="2820434043"/>
+        <p14:creationId xmlns:p14="http://schemas.microsoft.com/office/powerpoint/2010/main" val="675085363"/>
       </p:ext>
     </p:extLst>
   </p:cSld>
@@ -9902,8 +9777,8 @@
           <a:lstStyle/>
           <a:p>
             <a:r>
-              <a:rPr lang="en-US" dirty="0" smtClean="0"/>
-              <a:t>Copyright © EV3Lessons.com 2015 (Last edit: 2/26/2015)</a:t>
+              <a:rPr lang="en-US" smtClean="0"/>
+              <a:t>Copyright © EV3Lessons.com 2016 (Last edit: 07/04/2016)</a:t>
             </a:r>
             <a:endParaRPr lang="en-US" dirty="0"/>
           </a:p>
@@ -10209,7 +10084,7 @@
     </p:spTree>
     <p:extLst>
       <p:ext uri="{BB962C8B-B14F-4D97-AF65-F5344CB8AC3E}">
-        <p14:creationId xmlns:p14="http://schemas.microsoft.com/office/powerpoint/2010/main" val="784707006"/>
+        <p14:creationId xmlns:p14="http://schemas.microsoft.com/office/powerpoint/2010/main" val="1003588840"/>
       </p:ext>
     </p:extLst>
   </p:cSld>
@@ -10275,7 +10150,7 @@
         <p:spPr>
           <a:xfrm>
             <a:off x="4423232" y="1002742"/>
-            <a:ext cx="4423330" cy="5262979"/>
+            <a:ext cx="4279443" cy="4093428"/>
           </a:xfrm>
           <a:prstGeom prst="rect">
             <a:avLst/>
@@ -10401,115 +10276,115 @@
           <a:p>
             <a:pPr eaLnBrk="1" hangingPunct="1"/>
             <a:r>
-              <a:rPr lang="en-US" sz="2400" b="1" dirty="0"/>
+              <a:rPr lang="en-US" sz="2000" b="1" dirty="0"/>
               <a:t>Tabs on </a:t>
             </a:r>
             <a:r>
-              <a:rPr lang="en-US" sz="2400" b="1" dirty="0" smtClean="0"/>
+              <a:rPr lang="en-US" sz="2000" b="1" dirty="0" smtClean="0"/>
               <a:t>Screen</a:t>
             </a:r>
           </a:p>
           <a:p>
             <a:pPr eaLnBrk="1" hangingPunct="1"/>
-            <a:endParaRPr lang="en-US" sz="2400" b="1" dirty="0"/>
+            <a:endParaRPr lang="en-US" sz="2000" b="1" dirty="0"/>
           </a:p>
           <a:p>
             <a:pPr marL="457200" indent="-457200" eaLnBrk="1" hangingPunct="1">
               <a:buAutoNum type="arabicPeriod"/>
             </a:pPr>
             <a:r>
-              <a:rPr lang="en-US" sz="2400" b="1" dirty="0" smtClean="0"/>
+              <a:rPr lang="en-US" sz="2000" b="1" dirty="0" smtClean="0"/>
               <a:t>Run Recent</a:t>
             </a:r>
             <a:br>
-              <a:rPr lang="en-US" sz="2400" b="1" dirty="0" smtClean="0"/>
+              <a:rPr lang="en-US" sz="2000" b="1" dirty="0" smtClean="0"/>
             </a:br>
             <a:r>
-              <a:rPr lang="en-US" sz="2400" dirty="0" smtClean="0"/>
+              <a:rPr lang="en-US" sz="2000" dirty="0" smtClean="0"/>
               <a:t>Find programs you ran recently</a:t>
             </a:r>
-            <a:endParaRPr lang="en-US" sz="2400" dirty="0"/>
+            <a:endParaRPr lang="en-US" sz="2000" dirty="0"/>
           </a:p>
           <a:p>
             <a:pPr eaLnBrk="1" hangingPunct="1"/>
-            <a:endParaRPr lang="en-US" sz="2400" dirty="0" smtClean="0"/>
+            <a:endParaRPr lang="en-US" sz="2000" dirty="0" smtClean="0"/>
           </a:p>
           <a:p>
             <a:pPr marL="452438" indent="-452438" defTabSz="511175" eaLnBrk="1" hangingPunct="1"/>
             <a:r>
-              <a:rPr lang="en-US" sz="2400" b="1" dirty="0" smtClean="0"/>
+              <a:rPr lang="en-US" sz="2000" b="1" dirty="0" smtClean="0"/>
               <a:t>2.  </a:t>
             </a:r>
             <a:r>
-              <a:rPr lang="en-US" sz="2400" b="1" dirty="0"/>
+              <a:rPr lang="en-US" sz="2000" b="1" dirty="0"/>
               <a:t>File </a:t>
             </a:r>
             <a:r>
-              <a:rPr lang="en-US" sz="2400" b="1" dirty="0" smtClean="0"/>
+              <a:rPr lang="en-US" sz="2000" b="1" dirty="0" smtClean="0"/>
               <a:t>Navigation</a:t>
             </a:r>
             <a:br>
-              <a:rPr lang="en-US" sz="2400" b="1" dirty="0" smtClean="0"/>
+              <a:rPr lang="en-US" sz="2000" b="1" dirty="0" smtClean="0"/>
             </a:br>
             <a:r>
-              <a:rPr lang="en-US" sz="2400" dirty="0" smtClean="0"/>
+              <a:rPr lang="en-US" sz="2000" dirty="0" smtClean="0"/>
               <a:t>Find all programs by project</a:t>
             </a:r>
-            <a:endParaRPr lang="en-US" sz="2400" dirty="0"/>
+            <a:endParaRPr lang="en-US" sz="2000" dirty="0"/>
           </a:p>
           <a:p>
             <a:pPr eaLnBrk="1" hangingPunct="1"/>
-            <a:endParaRPr lang="en-US" sz="2400" dirty="0" smtClean="0"/>
+            <a:endParaRPr lang="en-US" sz="2000" dirty="0" smtClean="0"/>
           </a:p>
           <a:p>
             <a:pPr marL="452438" indent="-452438" eaLnBrk="1" hangingPunct="1"/>
             <a:r>
-              <a:rPr lang="en-US" sz="2400" b="1" dirty="0" smtClean="0"/>
+              <a:rPr lang="en-US" sz="2000" b="1" dirty="0" smtClean="0"/>
               <a:t>3.  </a:t>
             </a:r>
             <a:r>
-              <a:rPr lang="en-US" sz="2400" b="1" dirty="0"/>
+              <a:rPr lang="en-US" sz="2000" b="1" dirty="0"/>
               <a:t>Brick </a:t>
             </a:r>
             <a:r>
-              <a:rPr lang="en-US" sz="2400" b="1" dirty="0" smtClean="0"/>
+              <a:rPr lang="en-US" sz="2000" b="1" dirty="0" smtClean="0"/>
               <a:t>Apps</a:t>
             </a:r>
             <a:br>
-              <a:rPr lang="en-US" sz="2400" b="1" dirty="0" smtClean="0"/>
+              <a:rPr lang="en-US" sz="2000" b="1" dirty="0" smtClean="0"/>
             </a:br>
             <a:r>
-              <a:rPr lang="en-US" sz="2400" dirty="0" smtClean="0"/>
+              <a:rPr lang="en-US" sz="2000" dirty="0" smtClean="0"/>
               <a:t>Port views</a:t>
             </a:r>
-            <a:endParaRPr lang="en-US" sz="2400" dirty="0"/>
+            <a:endParaRPr lang="en-US" sz="2000" dirty="0"/>
           </a:p>
           <a:p>
             <a:pPr eaLnBrk="1" hangingPunct="1"/>
-            <a:endParaRPr lang="en-US" sz="2400" dirty="0" smtClean="0"/>
+            <a:endParaRPr lang="en-US" sz="2000" dirty="0" smtClean="0"/>
           </a:p>
           <a:p>
             <a:pPr marL="452438" indent="-452438" eaLnBrk="1" hangingPunct="1"/>
             <a:r>
-              <a:rPr lang="en-US" sz="2400" b="1" dirty="0" smtClean="0"/>
+              <a:rPr lang="en-US" sz="2000" b="1" dirty="0" smtClean="0"/>
               <a:t>4.  Settings</a:t>
             </a:r>
             <a:br>
-              <a:rPr lang="en-US" sz="2400" b="1" dirty="0" smtClean="0"/>
+              <a:rPr lang="en-US" sz="2000" b="1" dirty="0" smtClean="0"/>
             </a:br>
             <a:r>
-              <a:rPr lang="en-US" sz="2400" dirty="0" smtClean="0"/>
+              <a:rPr lang="en-US" sz="2000" dirty="0" smtClean="0"/>
               <a:t>Bluetooth, </a:t>
             </a:r>
             <a:r>
-              <a:rPr lang="en-US" sz="2400" dirty="0" err="1" smtClean="0"/>
+              <a:rPr lang="en-US" sz="2000" dirty="0" err="1" smtClean="0"/>
               <a:t>Wifi</a:t>
             </a:r>
             <a:r>
-              <a:rPr lang="en-US" sz="2400" dirty="0" smtClean="0"/>
+              <a:rPr lang="en-US" sz="2000" dirty="0" smtClean="0"/>
               <a:t>, Volume</a:t>
             </a:r>
-            <a:endParaRPr lang="en-US" sz="2400" dirty="0"/>
+            <a:endParaRPr lang="en-US" sz="2000" dirty="0"/>
           </a:p>
         </p:txBody>
       </p:sp>
@@ -10530,7 +10405,7 @@
           <a:p>
             <a:r>
               <a:rPr lang="en-US" smtClean="0"/>
-              <a:t>Copyright © EV3Lessons.com 2015 (Last edit: 2/26/2015)</a:t>
+              <a:t>Copyright © EV3Lessons.com 2016 (Last edit: 07/04/2016)</a:t>
             </a:r>
             <a:endParaRPr lang="en-US"/>
           </a:p>
@@ -10772,7 +10647,7 @@
     </p:spTree>
     <p:extLst>
       <p:ext uri="{BB962C8B-B14F-4D97-AF65-F5344CB8AC3E}">
-        <p14:creationId xmlns:p14="http://schemas.microsoft.com/office/powerpoint/2010/main" val="1105272563"/>
+        <p14:creationId xmlns:p14="http://schemas.microsoft.com/office/powerpoint/2010/main" val="469796328"/>
       </p:ext>
     </p:extLst>
   </p:cSld>
@@ -10887,16 +10762,16 @@
         <p:spPr>
           <a:xfrm>
             <a:off x="457199" y="6492875"/>
-            <a:ext cx="3429000" cy="283845"/>
-          </a:xfrm>
-        </p:spPr>
-        <p:txBody>
-          <a:bodyPr/>
-          <a:lstStyle/>
-          <a:p>
-            <a:r>
-              <a:rPr lang="en-US" smtClean="0"/>
-              <a:t>Copyright © EV3Lessons.com 2015 (Last edit: 2/26/2015)</a:t>
+            <a:ext cx="3841532" cy="283845"/>
+          </a:xfrm>
+        </p:spPr>
+        <p:txBody>
+          <a:bodyPr/>
+          <a:lstStyle/>
+          <a:p>
+            <a:r>
+              <a:rPr lang="en-US" smtClean="0"/>
+              <a:t>Copyright © EV3Lessons.com 2016 (Last edit: 07/04/2016)</a:t>
             </a:r>
             <a:endParaRPr lang="en-US" dirty="0"/>
           </a:p>
@@ -10911,15 +10786,15 @@
           <p:nvPr/>
         </p:nvPicPr>
         <p:blipFill>
-          <a:blip r:embed="rId2"/>
+          <a:blip r:embed="rId3"/>
           <a:stretch>
             <a:fillRect/>
           </a:stretch>
         </p:blipFill>
         <p:spPr>
           <a:xfrm>
-            <a:off x="-203200" y="1504445"/>
-            <a:ext cx="9029700" cy="5080000"/>
+            <a:off x="0" y="1504445"/>
+            <a:ext cx="8826500" cy="5080000"/>
           </a:xfrm>
           <a:prstGeom prst="rect">
             <a:avLst/>
@@ -11389,7 +11264,7 @@
     </p:spTree>
     <p:extLst>
       <p:ext uri="{BB962C8B-B14F-4D97-AF65-F5344CB8AC3E}">
-        <p14:creationId xmlns:p14="http://schemas.microsoft.com/office/powerpoint/2010/main" val="2796257914"/>
+        <p14:creationId xmlns:p14="http://schemas.microsoft.com/office/powerpoint/2010/main" val="1853066729"/>
       </p:ext>
     </p:extLst>
   </p:cSld>
@@ -11463,7 +11338,7 @@
           <a:p>
             <a:r>
               <a:rPr lang="en-US" smtClean="0"/>
-              <a:t>Copyright © EV3Lessons.com 2015 (Last edit: 2/26/2015)</a:t>
+              <a:t>Copyright © EV3Lessons.com 2016 (Last edit: 07/04/2016)</a:t>
             </a:r>
             <a:endParaRPr lang="en-US"/>
           </a:p>
@@ -11659,7 +11534,7 @@
     </p:spTree>
     <p:extLst>
       <p:ext uri="{BB962C8B-B14F-4D97-AF65-F5344CB8AC3E}">
-        <p14:creationId xmlns:p14="http://schemas.microsoft.com/office/powerpoint/2010/main" val="2616915322"/>
+        <p14:creationId xmlns:p14="http://schemas.microsoft.com/office/powerpoint/2010/main" val="1684665509"/>
       </p:ext>
     </p:extLst>
   </p:cSld>
@@ -12270,7 +12145,7 @@
           <a:p>
             <a:r>
               <a:rPr lang="en-US" smtClean="0"/>
-              <a:t>Copyright © EV3Lessons.com 2015 (Last edit: 2/26/2015)</a:t>
+              <a:t>Copyright © EV3Lessons.com 2016 (Last edit: 07/04/2016)</a:t>
             </a:r>
             <a:endParaRPr lang="en-US"/>
           </a:p>
@@ -12302,7 +12177,7 @@
     </p:spTree>
     <p:extLst>
       <p:ext uri="{BB962C8B-B14F-4D97-AF65-F5344CB8AC3E}">
-        <p14:creationId xmlns:p14="http://schemas.microsoft.com/office/powerpoint/2010/main" val="2429354027"/>
+        <p14:creationId xmlns:p14="http://schemas.microsoft.com/office/powerpoint/2010/main" val="1748807715"/>
       </p:ext>
     </p:extLst>
   </p:cSld>
@@ -12520,15 +12395,15 @@
             </a:r>
             <a:r>
               <a:rPr lang="en-US" sz="2600" b="0" dirty="0" smtClean="0"/>
-              <a:t>from the </a:t>
-            </a:r>
-            <a:r>
-              <a:rPr lang="en-US" sz="2600" b="0" dirty="0" err="1"/>
-              <a:t>the</a:t>
+              <a:t>from </a:t>
+            </a:r>
+            <a:r>
+              <a:rPr lang="en-US" sz="2600" b="0" dirty="0" smtClean="0"/>
+              <a:t>the </a:t>
             </a:r>
             <a:r>
               <a:rPr lang="en-US" sz="2600" b="0" dirty="0"/>
-              <a:t> File menu</a:t>
+              <a:t>File menu</a:t>
             </a:r>
             <a:r>
               <a:rPr lang="en-US" sz="2600" b="0" dirty="0" smtClean="0"/>
@@ -12705,7 +12580,7 @@
           <a:p>
             <a:r>
               <a:rPr lang="en-US" smtClean="0"/>
-              <a:t>Copyright © EV3Lessons.com 2015 (Last edit: 2/26/2015)</a:t>
+              <a:t>Copyright © EV3Lessons.com 2016 (Last edit: 07/04/2016)</a:t>
             </a:r>
             <a:endParaRPr lang="en-US"/>
           </a:p>
@@ -12737,7 +12612,7 @@
     </p:spTree>
     <p:extLst>
       <p:ext uri="{BB962C8B-B14F-4D97-AF65-F5344CB8AC3E}">
-        <p14:creationId xmlns:p14="http://schemas.microsoft.com/office/powerpoint/2010/main" val="79322009"/>
+        <p14:creationId xmlns:p14="http://schemas.microsoft.com/office/powerpoint/2010/main" val="1750073163"/>
       </p:ext>
     </p:extLst>
   </p:cSld>
@@ -12985,7 +12860,7 @@
           <a:p>
             <a:r>
               <a:rPr lang="en-US" smtClean="0"/>
-              <a:t>Copyright © EV3Lessons.com 2015 (Last edit: 2/26/2015)</a:t>
+              <a:t>Copyright © EV3Lessons.com 2016 (Last edit: 07/04/2016)</a:t>
             </a:r>
             <a:endParaRPr lang="en-US"/>
           </a:p>
@@ -13017,7 +12892,7 @@
     </p:spTree>
     <p:extLst>
       <p:ext uri="{BB962C8B-B14F-4D97-AF65-F5344CB8AC3E}">
-        <p14:creationId xmlns:p14="http://schemas.microsoft.com/office/powerpoint/2010/main" val="1715079895"/>
+        <p14:creationId xmlns:p14="http://schemas.microsoft.com/office/powerpoint/2010/main" val="2039540043"/>
       </p:ext>
     </p:extLst>
   </p:cSld>
@@ -13035,7 +12910,7 @@
 </file>
 
 <file path=ppt/theme/theme1.xml><?xml version="1.0" encoding="utf-8"?>
-<a:theme xmlns:a="http://schemas.openxmlformats.org/drawingml/2006/main" name="Essential">
+<a:theme xmlns:a="http://schemas.openxmlformats.org/drawingml/2006/main" name="beginner">
   <a:themeElements>
     <a:clrScheme name="Essential">
       <a:dk1>
@@ -13284,6 +13159,11 @@
   </a:themeElements>
   <a:objectDefaults/>
   <a:extraClrSchemeLst/>
+  <a:extLst>
+    <a:ext uri="{05A4C25C-085E-4340-85A3-A5531E510DB2}">
+      <thm15:themeFamily xmlns:thm15="http://schemas.microsoft.com/office/thememl/2012/main" name="beginner" id="{2CEFEB64-C992-CF42-AC34-A2A7B15E4CF5}" vid="{484731AA-B6D9-C841-B3ED-40BE794FD840}"/>
+    </a:ext>
+  </a:extLst>
 </a:theme>
 </file>
 
@@ -13559,44 +13439,44 @@
         <a:sysClr val="window" lastClr="FFFFFF"/>
       </a:lt1>
       <a:dk2>
-        <a:srgbClr val="1F497D"/>
+        <a:srgbClr val="44546A"/>
       </a:dk2>
       <a:lt2>
-        <a:srgbClr val="EEECE1"/>
+        <a:srgbClr val="E7E6E6"/>
       </a:lt2>
       <a:accent1>
-        <a:srgbClr val="4F81BD"/>
+        <a:srgbClr val="5B9BD5"/>
       </a:accent1>
       <a:accent2>
-        <a:srgbClr val="C0504D"/>
+        <a:srgbClr val="ED7D31"/>
       </a:accent2>
       <a:accent3>
-        <a:srgbClr val="9BBB59"/>
+        <a:srgbClr val="A5A5A5"/>
       </a:accent3>
       <a:accent4>
-        <a:srgbClr val="8064A2"/>
+        <a:srgbClr val="FFC000"/>
       </a:accent4>
       <a:accent5>
-        <a:srgbClr val="4BACC6"/>
+        <a:srgbClr val="4472C4"/>
       </a:accent5>
       <a:accent6>
-        <a:srgbClr val="F79646"/>
+        <a:srgbClr val="70AD47"/>
       </a:accent6>
       <a:hlink>
-        <a:srgbClr val="0000FF"/>
+        <a:srgbClr val="0563C1"/>
       </a:hlink>
       <a:folHlink>
-        <a:srgbClr val="800080"/>
+        <a:srgbClr val="954F72"/>
       </a:folHlink>
     </a:clrScheme>
     <a:fontScheme name="Office">
       <a:majorFont>
-        <a:latin typeface="Calibri"/>
+        <a:latin typeface="Calibri Light" panose="020F0302020204030204"/>
         <a:ea typeface=""/>
         <a:cs typeface=""/>
-        <a:font script="Jpan" typeface="ＭＳ Ｐゴシック"/>
+        <a:font script="Jpan" typeface="Yu Gothic Light"/>
         <a:font script="Hang" typeface="맑은 고딕"/>
-        <a:font script="Hans" typeface="宋体"/>
+        <a:font script="Hans" typeface="DengXian Light"/>
         <a:font script="Hant" typeface="新細明體"/>
         <a:font script="Arab" typeface="Times New Roman"/>
         <a:font script="Hebr" typeface="Times New Roman"/>
@@ -13626,12 +13506,12 @@
         <a:font script="Geor" typeface="Sylfaen"/>
       </a:majorFont>
       <a:minorFont>
-        <a:latin typeface="Calibri"/>
+        <a:latin typeface="Calibri" panose="020F0502020204030204"/>
         <a:ea typeface=""/>
         <a:cs typeface=""/>
-        <a:font script="Jpan" typeface="ＭＳ Ｐゴシック"/>
+        <a:font script="Jpan" typeface="Yu Gothic"/>
         <a:font script="Hang" typeface="맑은 고딕"/>
-        <a:font script="Hans" typeface="宋体"/>
+        <a:font script="Hans" typeface="DengXian"/>
         <a:font script="Hant" typeface="新細明體"/>
         <a:font script="Arab" typeface="Arial"/>
         <a:font script="Hebr" typeface="Arial"/>
@@ -13670,520 +13550,141 @@
           <a:gsLst>
             <a:gs pos="0">
               <a:schemeClr val="phClr">
-                <a:tint val="50000"/>
-                <a:satMod val="300000"/>
+                <a:lumMod val="110000"/>
+                <a:satMod val="105000"/>
+                <a:tint val="67000"/>
               </a:schemeClr>
             </a:gs>
-            <a:gs pos="35000">
+            <a:gs pos="50000">
               <a:schemeClr val="phClr">
-                <a:tint val="37000"/>
-                <a:satMod val="300000"/>
+                <a:lumMod val="105000"/>
+                <a:satMod val="103000"/>
+                <a:tint val="73000"/>
               </a:schemeClr>
             </a:gs>
             <a:gs pos="100000">
               <a:schemeClr val="phClr">
-                <a:tint val="15000"/>
-                <a:satMod val="350000"/>
+                <a:lumMod val="105000"/>
+                <a:satMod val="109000"/>
+                <a:tint val="81000"/>
               </a:schemeClr>
             </a:gs>
           </a:gsLst>
-          <a:lin ang="16200000" scaled="1"/>
+          <a:lin ang="5400000" scaled="0"/>
         </a:gradFill>
         <a:gradFill rotWithShape="1">
           <a:gsLst>
             <a:gs pos="0">
               <a:schemeClr val="phClr">
-                <a:tint val="100000"/>
+                <a:satMod val="103000"/>
+                <a:lumMod val="102000"/>
+                <a:tint val="94000"/>
+              </a:schemeClr>
+            </a:gs>
+            <a:gs pos="50000">
+              <a:schemeClr val="phClr">
+                <a:satMod val="110000"/>
+                <a:lumMod val="100000"/>
                 <a:shade val="100000"/>
-                <a:satMod val="130000"/>
               </a:schemeClr>
             </a:gs>
             <a:gs pos="100000">
               <a:schemeClr val="phClr">
-                <a:tint val="50000"/>
-                <a:shade val="100000"/>
-                <a:satMod val="350000"/>
+                <a:lumMod val="99000"/>
+                <a:satMod val="120000"/>
+                <a:shade val="78000"/>
               </a:schemeClr>
             </a:gs>
           </a:gsLst>
-          <a:lin ang="16200000" scaled="0"/>
+          <a:lin ang="5400000" scaled="0"/>
         </a:gradFill>
       </a:fillStyleLst>
       <a:lnStyleLst>
-        <a:ln w="9525" cap="flat" cmpd="sng" algn="ctr">
-          <a:solidFill>
-            <a:schemeClr val="phClr">
-              <a:shade val="95000"/>
-              <a:satMod val="105000"/>
-            </a:schemeClr>
-          </a:solidFill>
-          <a:prstDash val="solid"/>
-        </a:ln>
-        <a:ln w="25400" cap="flat" cmpd="sng" algn="ctr">
+        <a:ln w="6350" cap="flat" cmpd="sng" algn="ctr">
           <a:solidFill>
             <a:schemeClr val="phClr"/>
           </a:solidFill>
           <a:prstDash val="solid"/>
+          <a:miter lim="800000"/>
         </a:ln>
-        <a:ln w="38100" cap="flat" cmpd="sng" algn="ctr">
+        <a:ln w="12700" cap="flat" cmpd="sng" algn="ctr">
           <a:solidFill>
             <a:schemeClr val="phClr"/>
           </a:solidFill>
           <a:prstDash val="solid"/>
+          <a:miter lim="800000"/>
+        </a:ln>
+        <a:ln w="19050" cap="flat" cmpd="sng" algn="ctr">
+          <a:solidFill>
+            <a:schemeClr val="phClr"/>
+          </a:solidFill>
+          <a:prstDash val="solid"/>
+          <a:miter lim="800000"/>
         </a:ln>
       </a:lnStyleLst>
       <a:effectStyleLst>
         <a:effectStyle>
+          <a:effectLst/>
+        </a:effectStyle>
+        <a:effectStyle>
+          <a:effectLst/>
+        </a:effectStyle>
+        <a:effectStyle>
           <a:effectLst>
-            <a:outerShdw blurRad="40000" dist="20000" dir="5400000" rotWithShape="0">
+            <a:outerShdw blurRad="57150" dist="19050" dir="5400000" algn="ctr" rotWithShape="0">
               <a:srgbClr val="000000">
-                <a:alpha val="38000"/>
+                <a:alpha val="63000"/>
               </a:srgbClr>
             </a:outerShdw>
           </a:effectLst>
-        </a:effectStyle>
-        <a:effectStyle>
-          <a:effectLst>
-            <a:outerShdw blurRad="40000" dist="23000" dir="5400000" rotWithShape="0">
-              <a:srgbClr val="000000">
-                <a:alpha val="35000"/>
-              </a:srgbClr>
-            </a:outerShdw>
-          </a:effectLst>
-        </a:effectStyle>
-        <a:effectStyle>
-          <a:effectLst>
-            <a:outerShdw blurRad="40000" dist="23000" dir="5400000" rotWithShape="0">
-              <a:srgbClr val="000000">
-                <a:alpha val="35000"/>
-              </a:srgbClr>
-            </a:outerShdw>
-          </a:effectLst>
-          <a:scene3d>
-            <a:camera prst="orthographicFront">
-              <a:rot lat="0" lon="0" rev="0"/>
-            </a:camera>
-            <a:lightRig rig="threePt" dir="t">
-              <a:rot lat="0" lon="0" rev="1200000"/>
-            </a:lightRig>
-          </a:scene3d>
-          <a:sp3d>
-            <a:bevelT w="63500" h="25400"/>
-          </a:sp3d>
         </a:effectStyle>
       </a:effectStyleLst>
       <a:bgFillStyleLst>
         <a:solidFill>
           <a:schemeClr val="phClr"/>
         </a:solidFill>
-        <a:gradFill rotWithShape="1">
-          <a:gsLst>
-            <a:gs pos="0">
-              <a:schemeClr val="phClr">
-                <a:tint val="40000"/>
-                <a:satMod val="350000"/>
-              </a:schemeClr>
-            </a:gs>
-            <a:gs pos="40000">
-              <a:schemeClr val="phClr">
-                <a:tint val="45000"/>
-                <a:shade val="99000"/>
-                <a:satMod val="350000"/>
-              </a:schemeClr>
-            </a:gs>
-            <a:gs pos="100000">
-              <a:schemeClr val="phClr">
-                <a:shade val="20000"/>
-                <a:satMod val="255000"/>
-              </a:schemeClr>
-            </a:gs>
-          </a:gsLst>
-          <a:path path="circle">
-            <a:fillToRect l="50000" t="-80000" r="50000" b="180000"/>
-          </a:path>
-        </a:gradFill>
-        <a:gradFill rotWithShape="1">
-          <a:gsLst>
-            <a:gs pos="0">
-              <a:schemeClr val="phClr">
-                <a:tint val="80000"/>
-                <a:satMod val="300000"/>
-              </a:schemeClr>
-            </a:gs>
-            <a:gs pos="100000">
-              <a:schemeClr val="phClr">
-                <a:shade val="30000"/>
-                <a:satMod val="200000"/>
-              </a:schemeClr>
-            </a:gs>
-          </a:gsLst>
-          <a:path path="circle">
-            <a:fillToRect l="50000" t="50000" r="50000" b="50000"/>
-          </a:path>
-        </a:gradFill>
-      </a:bgFillStyleLst>
-    </a:fmtScheme>
-  </a:themeElements>
-  <a:objectDefaults>
-    <a:spDef>
-      <a:spPr/>
-      <a:bodyPr/>
-      <a:lstStyle/>
-      <a:style>
-        <a:lnRef idx="1">
-          <a:schemeClr val="accent1"/>
-        </a:lnRef>
-        <a:fillRef idx="3">
-          <a:schemeClr val="accent1"/>
-        </a:fillRef>
-        <a:effectRef idx="2">
-          <a:schemeClr val="accent1"/>
-        </a:effectRef>
-        <a:fontRef idx="minor">
-          <a:schemeClr val="lt1"/>
-        </a:fontRef>
-      </a:style>
-    </a:spDef>
-    <a:lnDef>
-      <a:spPr/>
-      <a:bodyPr/>
-      <a:lstStyle/>
-      <a:style>
-        <a:lnRef idx="2">
-          <a:schemeClr val="accent1"/>
-        </a:lnRef>
-        <a:fillRef idx="0">
-          <a:schemeClr val="accent1"/>
-        </a:fillRef>
-        <a:effectRef idx="1">
-          <a:schemeClr val="accent1"/>
-        </a:effectRef>
-        <a:fontRef idx="minor">
-          <a:schemeClr val="tx1"/>
-        </a:fontRef>
-      </a:style>
-    </a:lnDef>
-  </a:objectDefaults>
-  <a:extraClrSchemeLst/>
-</a:theme>
-</file>
-
-<file path=ppt/theme/theme4.xml><?xml version="1.0" encoding="utf-8"?>
-<a:theme xmlns:a="http://schemas.openxmlformats.org/drawingml/2006/main" name="Office Theme">
-  <a:themeElements>
-    <a:clrScheme name="Office">
-      <a:dk1>
-        <a:sysClr val="windowText" lastClr="000000"/>
-      </a:dk1>
-      <a:lt1>
-        <a:sysClr val="window" lastClr="FFFFFF"/>
-      </a:lt1>
-      <a:dk2>
-        <a:srgbClr val="1F497D"/>
-      </a:dk2>
-      <a:lt2>
-        <a:srgbClr val="EEECE1"/>
-      </a:lt2>
-      <a:accent1>
-        <a:srgbClr val="4F81BD"/>
-      </a:accent1>
-      <a:accent2>
-        <a:srgbClr val="C0504D"/>
-      </a:accent2>
-      <a:accent3>
-        <a:srgbClr val="9BBB59"/>
-      </a:accent3>
-      <a:accent4>
-        <a:srgbClr val="8064A2"/>
-      </a:accent4>
-      <a:accent5>
-        <a:srgbClr val="4BACC6"/>
-      </a:accent5>
-      <a:accent6>
-        <a:srgbClr val="F79646"/>
-      </a:accent6>
-      <a:hlink>
-        <a:srgbClr val="0000FF"/>
-      </a:hlink>
-      <a:folHlink>
-        <a:srgbClr val="800080"/>
-      </a:folHlink>
-    </a:clrScheme>
-    <a:fontScheme name="Office">
-      <a:majorFont>
-        <a:latin typeface="Calibri"/>
-        <a:ea typeface=""/>
-        <a:cs typeface=""/>
-        <a:font script="Jpan" typeface="ＭＳ Ｐゴシック"/>
-        <a:font script="Hang" typeface="맑은 고딕"/>
-        <a:font script="Hans" typeface="宋体"/>
-        <a:font script="Hant" typeface="新細明體"/>
-        <a:font script="Arab" typeface="Times New Roman"/>
-        <a:font script="Hebr" typeface="Times New Roman"/>
-        <a:font script="Thai" typeface="Angsana New"/>
-        <a:font script="Ethi" typeface="Nyala"/>
-        <a:font script="Beng" typeface="Vrinda"/>
-        <a:font script="Gujr" typeface="Shruti"/>
-        <a:font script="Khmr" typeface="MoolBoran"/>
-        <a:font script="Knda" typeface="Tunga"/>
-        <a:font script="Guru" typeface="Raavi"/>
-        <a:font script="Cans" typeface="Euphemia"/>
-        <a:font script="Cher" typeface="Plantagenet Cherokee"/>
-        <a:font script="Yiii" typeface="Microsoft Yi Baiti"/>
-        <a:font script="Tibt" typeface="Microsoft Himalaya"/>
-        <a:font script="Thaa" typeface="MV Boli"/>
-        <a:font script="Deva" typeface="Mangal"/>
-        <a:font script="Telu" typeface="Gautami"/>
-        <a:font script="Taml" typeface="Latha"/>
-        <a:font script="Syrc" typeface="Estrangelo Edessa"/>
-        <a:font script="Orya" typeface="Kalinga"/>
-        <a:font script="Mlym" typeface="Kartika"/>
-        <a:font script="Laoo" typeface="DokChampa"/>
-        <a:font script="Sinh" typeface="Iskoola Pota"/>
-        <a:font script="Mong" typeface="Mongolian Baiti"/>
-        <a:font script="Viet" typeface="Times New Roman"/>
-        <a:font script="Uigh" typeface="Microsoft Uighur"/>
-        <a:font script="Geor" typeface="Sylfaen"/>
-      </a:majorFont>
-      <a:minorFont>
-        <a:latin typeface="Calibri"/>
-        <a:ea typeface=""/>
-        <a:cs typeface=""/>
-        <a:font script="Jpan" typeface="ＭＳ Ｐゴシック"/>
-        <a:font script="Hang" typeface="맑은 고딕"/>
-        <a:font script="Hans" typeface="宋体"/>
-        <a:font script="Hant" typeface="新細明體"/>
-        <a:font script="Arab" typeface="Arial"/>
-        <a:font script="Hebr" typeface="Arial"/>
-        <a:font script="Thai" typeface="Cordia New"/>
-        <a:font script="Ethi" typeface="Nyala"/>
-        <a:font script="Beng" typeface="Vrinda"/>
-        <a:font script="Gujr" typeface="Shruti"/>
-        <a:font script="Khmr" typeface="DaunPenh"/>
-        <a:font script="Knda" typeface="Tunga"/>
-        <a:font script="Guru" typeface="Raavi"/>
-        <a:font script="Cans" typeface="Euphemia"/>
-        <a:font script="Cher" typeface="Plantagenet Cherokee"/>
-        <a:font script="Yiii" typeface="Microsoft Yi Baiti"/>
-        <a:font script="Tibt" typeface="Microsoft Himalaya"/>
-        <a:font script="Thaa" typeface="MV Boli"/>
-        <a:font script="Deva" typeface="Mangal"/>
-        <a:font script="Telu" typeface="Gautami"/>
-        <a:font script="Taml" typeface="Latha"/>
-        <a:font script="Syrc" typeface="Estrangelo Edessa"/>
-        <a:font script="Orya" typeface="Kalinga"/>
-        <a:font script="Mlym" typeface="Kartika"/>
-        <a:font script="Laoo" typeface="DokChampa"/>
-        <a:font script="Sinh" typeface="Iskoola Pota"/>
-        <a:font script="Mong" typeface="Mongolian Baiti"/>
-        <a:font script="Viet" typeface="Arial"/>
-        <a:font script="Uigh" typeface="Microsoft Uighur"/>
-        <a:font script="Geor" typeface="Sylfaen"/>
-      </a:minorFont>
-    </a:fontScheme>
-    <a:fmtScheme name="Office">
-      <a:fillStyleLst>
         <a:solidFill>
-          <a:schemeClr val="phClr"/>
+          <a:schemeClr val="phClr">
+            <a:tint val="95000"/>
+            <a:satMod val="170000"/>
+          </a:schemeClr>
         </a:solidFill>
         <a:gradFill rotWithShape="1">
           <a:gsLst>
             <a:gs pos="0">
               <a:schemeClr val="phClr">
-                <a:tint val="50000"/>
-                <a:satMod val="300000"/>
+                <a:tint val="93000"/>
+                <a:satMod val="150000"/>
+                <a:shade val="98000"/>
+                <a:lumMod val="102000"/>
               </a:schemeClr>
             </a:gs>
-            <a:gs pos="35000">
+            <a:gs pos="50000">
               <a:schemeClr val="phClr">
-                <a:tint val="37000"/>
-                <a:satMod val="300000"/>
+                <a:tint val="98000"/>
+                <a:satMod val="130000"/>
+                <a:shade val="90000"/>
+                <a:lumMod val="103000"/>
               </a:schemeClr>
             </a:gs>
             <a:gs pos="100000">
               <a:schemeClr val="phClr">
-                <a:tint val="15000"/>
-                <a:satMod val="350000"/>
+                <a:shade val="63000"/>
+                <a:satMod val="120000"/>
               </a:schemeClr>
             </a:gs>
           </a:gsLst>
-          <a:lin ang="16200000" scaled="1"/>
-        </a:gradFill>
-        <a:gradFill rotWithShape="1">
-          <a:gsLst>
-            <a:gs pos="0">
-              <a:schemeClr val="phClr">
-                <a:tint val="100000"/>
-                <a:shade val="100000"/>
-                <a:satMod val="130000"/>
-              </a:schemeClr>
-            </a:gs>
-            <a:gs pos="100000">
-              <a:schemeClr val="phClr">
-                <a:tint val="50000"/>
-                <a:shade val="100000"/>
-                <a:satMod val="350000"/>
-              </a:schemeClr>
-            </a:gs>
-          </a:gsLst>
-          <a:lin ang="16200000" scaled="0"/>
-        </a:gradFill>
-      </a:fillStyleLst>
-      <a:lnStyleLst>
-        <a:ln w="9525" cap="flat" cmpd="sng" algn="ctr">
-          <a:solidFill>
-            <a:schemeClr val="phClr">
-              <a:shade val="95000"/>
-              <a:satMod val="105000"/>
-            </a:schemeClr>
-          </a:solidFill>
-          <a:prstDash val="solid"/>
-        </a:ln>
-        <a:ln w="25400" cap="flat" cmpd="sng" algn="ctr">
-          <a:solidFill>
-            <a:schemeClr val="phClr"/>
-          </a:solidFill>
-          <a:prstDash val="solid"/>
-        </a:ln>
-        <a:ln w="38100" cap="flat" cmpd="sng" algn="ctr">
-          <a:solidFill>
-            <a:schemeClr val="phClr"/>
-          </a:solidFill>
-          <a:prstDash val="solid"/>
-        </a:ln>
-      </a:lnStyleLst>
-      <a:effectStyleLst>
-        <a:effectStyle>
-          <a:effectLst>
-            <a:outerShdw blurRad="40000" dist="20000" dir="5400000" rotWithShape="0">
-              <a:srgbClr val="000000">
-                <a:alpha val="38000"/>
-              </a:srgbClr>
-            </a:outerShdw>
-          </a:effectLst>
-        </a:effectStyle>
-        <a:effectStyle>
-          <a:effectLst>
-            <a:outerShdw blurRad="40000" dist="23000" dir="5400000" rotWithShape="0">
-              <a:srgbClr val="000000">
-                <a:alpha val="35000"/>
-              </a:srgbClr>
-            </a:outerShdw>
-          </a:effectLst>
-        </a:effectStyle>
-        <a:effectStyle>
-          <a:effectLst>
-            <a:outerShdw blurRad="40000" dist="23000" dir="5400000" rotWithShape="0">
-              <a:srgbClr val="000000">
-                <a:alpha val="35000"/>
-              </a:srgbClr>
-            </a:outerShdw>
-          </a:effectLst>
-          <a:scene3d>
-            <a:camera prst="orthographicFront">
-              <a:rot lat="0" lon="0" rev="0"/>
-            </a:camera>
-            <a:lightRig rig="threePt" dir="t">
-              <a:rot lat="0" lon="0" rev="1200000"/>
-            </a:lightRig>
-          </a:scene3d>
-          <a:sp3d>
-            <a:bevelT w="63500" h="25400"/>
-          </a:sp3d>
-        </a:effectStyle>
-      </a:effectStyleLst>
-      <a:bgFillStyleLst>
-        <a:solidFill>
-          <a:schemeClr val="phClr"/>
-        </a:solidFill>
-        <a:gradFill rotWithShape="1">
-          <a:gsLst>
-            <a:gs pos="0">
-              <a:schemeClr val="phClr">
-                <a:tint val="40000"/>
-                <a:satMod val="350000"/>
-              </a:schemeClr>
-            </a:gs>
-            <a:gs pos="40000">
-              <a:schemeClr val="phClr">
-                <a:tint val="45000"/>
-                <a:shade val="99000"/>
-                <a:satMod val="350000"/>
-              </a:schemeClr>
-            </a:gs>
-            <a:gs pos="100000">
-              <a:schemeClr val="phClr">
-                <a:shade val="20000"/>
-                <a:satMod val="255000"/>
-              </a:schemeClr>
-            </a:gs>
-          </a:gsLst>
-          <a:path path="circle">
-            <a:fillToRect l="50000" t="-80000" r="50000" b="180000"/>
-          </a:path>
-        </a:gradFill>
-        <a:gradFill rotWithShape="1">
-          <a:gsLst>
-            <a:gs pos="0">
-              <a:schemeClr val="phClr">
-                <a:tint val="80000"/>
-                <a:satMod val="300000"/>
-              </a:schemeClr>
-            </a:gs>
-            <a:gs pos="100000">
-              <a:schemeClr val="phClr">
-                <a:shade val="30000"/>
-                <a:satMod val="200000"/>
-              </a:schemeClr>
-            </a:gs>
-          </a:gsLst>
-          <a:path path="circle">
-            <a:fillToRect l="50000" t="50000" r="50000" b="50000"/>
-          </a:path>
+          <a:lin ang="5400000" scaled="0"/>
         </a:gradFill>
       </a:bgFillStyleLst>
     </a:fmtScheme>
   </a:themeElements>
-  <a:objectDefaults>
-    <a:spDef>
-      <a:spPr/>
-      <a:bodyPr/>
-      <a:lstStyle/>
-      <a:style>
-        <a:lnRef idx="1">
-          <a:schemeClr val="accent1"/>
-        </a:lnRef>
-        <a:fillRef idx="3">
-          <a:schemeClr val="accent1"/>
-        </a:fillRef>
-        <a:effectRef idx="2">
-          <a:schemeClr val="accent1"/>
-        </a:effectRef>
-        <a:fontRef idx="minor">
-          <a:schemeClr val="lt1"/>
-        </a:fontRef>
-      </a:style>
-    </a:spDef>
-    <a:lnDef>
-      <a:spPr/>
-      <a:bodyPr/>
-      <a:lstStyle/>
-      <a:style>
-        <a:lnRef idx="2">
-          <a:schemeClr val="accent1"/>
-        </a:lnRef>
-        <a:fillRef idx="0">
-          <a:schemeClr val="accent1"/>
-        </a:fillRef>
-        <a:effectRef idx="1">
-          <a:schemeClr val="accent1"/>
-        </a:effectRef>
-        <a:fontRef idx="minor">
-          <a:schemeClr val="tx1"/>
-        </a:fontRef>
-      </a:style>
-    </a:lnDef>
-  </a:objectDefaults>
+  <a:objectDefaults/>
   <a:extraClrSchemeLst/>
+  <a:extLst>
+    <a:ext uri="{05A4C25C-085E-4340-85A3-A5531E510DB2}">
+      <thm15:themeFamily xmlns:thm15="http://schemas.microsoft.com/office/thememl/2012/main" name="Office Theme" id="{62F939B6-93AF-4DB8-9C6B-D6C7DFDC589F}" vid="{4A3C46E8-61CC-4603-A589-7422A47A8E4A}"/>
+    </a:ext>
+  </a:extLst>
 </a:theme>
 </file>
</xml_diff>